<commit_message>
Extra detail in slides for session 5
</commit_message>
<xml_diff>
--- a/slides/Lecture_05_ODEsMetapopulation.pptx
+++ b/slides/Lecture_05_ODEsMetapopulation.pptx
@@ -5,7 +5,7 @@
     <p:sldMasterId id="2147483648" r:id="rId1"/>
   </p:sldMasterIdLst>
   <p:notesMasterIdLst>
-    <p:notesMasterId r:id="rId13"/>
+    <p:notesMasterId r:id="rId15"/>
   </p:notesMasterIdLst>
   <p:sldIdLst>
     <p:sldId id="368" r:id="rId2"/>
@@ -19,6 +19,8 @@
     <p:sldId id="263" r:id="rId10"/>
     <p:sldId id="264" r:id="rId11"/>
     <p:sldId id="265" r:id="rId12"/>
+    <p:sldId id="369" r:id="rId13"/>
+    <p:sldId id="370" r:id="rId14"/>
   </p:sldIdLst>
   <p:sldSz cx="9144000" cy="6858000" type="screen4x3"/>
   <p:notesSz cx="6858000" cy="9144000"/>
@@ -207,7 +209,7 @@
           <a:p>
             <a:fld id="{A0DD0A03-8D8D-F546-92C2-C76DD097A703}" type="datetimeFigureOut">
               <a:rPr lang="en-GB" smtClean="0"/>
-              <a:t>18/04/2023</a:t>
+              <a:t>10/09/2024</a:t>
             </a:fld>
             <a:endParaRPr lang="en-GB"/>
           </a:p>
@@ -730,7 +732,7 @@
             <a:fld id="{05CC55C5-3AE8-4299-988D-DFB8217A9B4E}" type="datetimeFigureOut">
               <a:rPr lang="en-GB" smtClean="0"/>
               <a:pPr/>
-              <a:t>18/04/2023</a:t>
+              <a:t>10/09/2024</a:t>
             </a:fld>
             <a:endParaRPr lang="en-GB" dirty="0"/>
           </a:p>
@@ -1086,7 +1088,7 @@
           <a:p>
             <a:fld id="{05CC55C5-3AE8-4299-988D-DFB8217A9B4E}" type="datetimeFigureOut">
               <a:rPr lang="en-GB" smtClean="0"/>
-              <a:t>18/04/2023</a:t>
+              <a:t>10/09/2024</a:t>
             </a:fld>
             <a:endParaRPr lang="en-GB"/>
           </a:p>
@@ -2999,8 +3001,8 @@
           </a:fontRef>
         </p:style>
       </p:cxnSp>
-      <mc:AlternateContent xmlns:mc="http://schemas.openxmlformats.org/markup-compatibility/2006">
-        <mc:Choice xmlns:a14="http://schemas.microsoft.com/office/drawing/2010/main" Requires="a14">
+      <mc:AlternateContent xmlns:mc="http://schemas.openxmlformats.org/markup-compatibility/2006" xmlns:a14="http://schemas.microsoft.com/office/drawing/2010/main">
+        <mc:Choice Requires="a14">
           <p:sp>
             <p:nvSpPr>
               <p:cNvPr id="13" name="TextBox 12">
@@ -3029,6 +3031,7 @@
               </a:bodyPr>
               <a:lstStyle/>
               <a:p>
+                <a:pPr/>
                 <a14:m>
                   <m:oMathPara xmlns:m="http://schemas.openxmlformats.org/officeDocument/2006/math">
                     <m:oMathParaPr>
@@ -3125,7 +3128,7 @@
             </p:txBody>
           </p:sp>
         </mc:Choice>
-        <mc:Fallback>
+        <mc:Fallback xmlns="">
           <p:sp>
             <p:nvSpPr>
               <p:cNvPr id="13" name="TextBox 12">
@@ -3170,8 +3173,8 @@
           </p:sp>
         </mc:Fallback>
       </mc:AlternateContent>
-      <mc:AlternateContent xmlns:mc="http://schemas.openxmlformats.org/markup-compatibility/2006">
-        <mc:Choice xmlns:a14="http://schemas.microsoft.com/office/drawing/2010/main" Requires="a14">
+      <mc:AlternateContent xmlns:mc="http://schemas.openxmlformats.org/markup-compatibility/2006" xmlns:a14="http://schemas.microsoft.com/office/drawing/2010/main">
+        <mc:Choice Requires="a14">
           <p:sp>
             <p:nvSpPr>
               <p:cNvPr id="14" name="TextBox 13">
@@ -3200,6 +3203,7 @@
               </a:bodyPr>
               <a:lstStyle/>
               <a:p>
+                <a:pPr/>
                 <a14:m>
                   <m:oMathPara xmlns:m="http://schemas.openxmlformats.org/officeDocument/2006/math">
                     <m:oMathParaPr>
@@ -3270,7 +3274,7 @@
             </p:txBody>
           </p:sp>
         </mc:Choice>
-        <mc:Fallback>
+        <mc:Fallback xmlns="">
           <p:sp>
             <p:nvSpPr>
               <p:cNvPr id="14" name="TextBox 13">
@@ -3315,8 +3319,8 @@
           </p:sp>
         </mc:Fallback>
       </mc:AlternateContent>
-      <mc:AlternateContent xmlns:mc="http://schemas.openxmlformats.org/markup-compatibility/2006">
-        <mc:Choice xmlns:a14="http://schemas.microsoft.com/office/drawing/2010/main" Requires="a14">
+      <mc:AlternateContent xmlns:mc="http://schemas.openxmlformats.org/markup-compatibility/2006" xmlns:a14="http://schemas.microsoft.com/office/drawing/2010/main">
+        <mc:Choice Requires="a14">
           <p:sp>
             <p:nvSpPr>
               <p:cNvPr id="15" name="TextBox 14">
@@ -3345,6 +3349,7 @@
               </a:bodyPr>
               <a:lstStyle/>
               <a:p>
+                <a:pPr/>
                 <a14:m>
                   <m:oMathPara xmlns:m="http://schemas.openxmlformats.org/officeDocument/2006/math">
                     <m:oMathParaPr>
@@ -3408,7 +3413,7 @@
             </p:txBody>
           </p:sp>
         </mc:Choice>
-        <mc:Fallback>
+        <mc:Fallback xmlns="">
           <p:sp>
             <p:nvSpPr>
               <p:cNvPr id="15" name="TextBox 14">
@@ -3453,8 +3458,8 @@
           </p:sp>
         </mc:Fallback>
       </mc:AlternateContent>
-      <mc:AlternateContent xmlns:mc="http://schemas.openxmlformats.org/markup-compatibility/2006">
-        <mc:Choice xmlns:a14="http://schemas.microsoft.com/office/drawing/2010/main" Requires="a14">
+      <mc:AlternateContent xmlns:mc="http://schemas.openxmlformats.org/markup-compatibility/2006" xmlns:a14="http://schemas.microsoft.com/office/drawing/2010/main">
+        <mc:Choice Requires="a14">
           <p:sp>
             <p:nvSpPr>
               <p:cNvPr id="16" name="TextBox 15">
@@ -3658,14 +3663,7 @@
                       <a:rPr lang="en-GB" b="0" i="1" smtClean="0">
                         <a:latin typeface="Cambria Math" panose="02040503050406030204" pitchFamily="18" charset="0"/>
                       </a:rPr>
-                      <m:t>=2.4×0.2</m:t>
-                    </m:r>
-                    <m:r>
-                      <a:rPr lang="en-GB" b="0" i="1" smtClean="0">
-                        <a:latin typeface="Cambria Math" panose="02040503050406030204" pitchFamily="18" charset="0"/>
-                        <a:ea typeface="Cambria Math" panose="02040503050406030204" pitchFamily="18" charset="0"/>
-                      </a:rPr>
-                      <m:t>5</m:t>
+                      <m:t>=2.4×0.25</m:t>
                     </m:r>
                   </m:oMath>
                 </a14:m>
@@ -3762,7 +3760,7 @@
             </p:txBody>
           </p:sp>
         </mc:Choice>
-        <mc:Fallback>
+        <mc:Fallback xmlns="">
           <p:sp>
             <p:nvSpPr>
               <p:cNvPr id="16" name="TextBox 15">
@@ -6013,35 +6011,8 @@
           <a:p>
             <a:pPr lvl="1"/>
             <a:r>
-              <a:rPr lang="en-GB" dirty="0"/>
-              <a:t>Open the practical</a:t>
-            </a:r>
-            <a:r>
               <a:rPr dirty="0"/>
-              <a:t> </a:t>
-            </a:r>
-            <a:r>
-              <a:rPr lang="en-GB" dirty="0"/>
-              <a:t>05_ODEMetapopulation/01_ODE_Metapop.R </a:t>
-            </a:r>
-            <a:r>
-              <a:rPr dirty="0"/>
-              <a:t>and add your code to the existing </a:t>
-            </a:r>
-            <a:r>
-              <a:rPr lang="en-GB" dirty="0"/>
-              <a:t>R </a:t>
-            </a:r>
-            <a:r>
-              <a:rPr dirty="0"/>
-              <a:t>script</a:t>
-            </a:r>
-          </a:p>
-          <a:p>
-            <a:pPr lvl="1"/>
-            <a:r>
-              <a:rPr dirty="0"/>
-              <a:t>Objective : implement SIR metapopulation model with two populations</a:t>
+              <a:t>Objective: implement SIR metapopulation model with two populations</a:t>
             </a:r>
           </a:p>
           <a:p>
@@ -6076,6 +6047,2773 @@
         </p:txBody>
       </p:sp>
     </p:spTree>
+  </p:cSld>
+  <p:clrMapOvr>
+    <a:masterClrMapping/>
+  </p:clrMapOvr>
+</p:sld>
+</file>
+
+<file path=ppt/slides/slide12.xml><?xml version="1.0" encoding="utf-8"?>
+<p:sld xmlns:a="http://schemas.openxmlformats.org/drawingml/2006/main" xmlns:r="http://schemas.openxmlformats.org/officeDocument/2006/relationships" xmlns:p="http://schemas.openxmlformats.org/presentationml/2006/main">
+  <p:cSld>
+    <p:spTree>
+      <p:nvGrpSpPr>
+        <p:cNvPr id="1" name="">
+          <a:extLst>
+            <a:ext uri="{FF2B5EF4-FFF2-40B4-BE49-F238E27FC236}">
+              <a16:creationId xmlns:a16="http://schemas.microsoft.com/office/drawing/2014/main" id="{7524FD5B-B3C2-B6FB-7276-F9F748DF86CD}"/>
+            </a:ext>
+          </a:extLst>
+        </p:cNvPr>
+        <p:cNvGrpSpPr/>
+        <p:nvPr/>
+      </p:nvGrpSpPr>
+      <p:grpSpPr>
+        <a:xfrm>
+          <a:off x="0" y="0"/>
+          <a:ext cx="0" cy="0"/>
+          <a:chOff x="0" y="0"/>
+          <a:chExt cx="0" cy="0"/>
+        </a:xfrm>
+      </p:grpSpPr>
+      <p:sp>
+        <p:nvSpPr>
+          <p:cNvPr id="5" name="Title 1">
+            <a:extLst>
+              <a:ext uri="{FF2B5EF4-FFF2-40B4-BE49-F238E27FC236}">
+                <a16:creationId xmlns:a16="http://schemas.microsoft.com/office/drawing/2014/main" id="{087840C7-9B95-F0FB-7D63-7C251AF53CD3}"/>
+              </a:ext>
+            </a:extLst>
+          </p:cNvPr>
+          <p:cNvSpPr>
+            <a:spLocks noGrp="1"/>
+          </p:cNvSpPr>
+          <p:nvPr>
+            <p:ph type="title" hasCustomPrompt="1"/>
+          </p:nvPr>
+        </p:nvSpPr>
+        <p:spPr>
+          <a:xfrm>
+            <a:off x="457201" y="279132"/>
+            <a:ext cx="6705600" cy="623236"/>
+          </a:xfrm>
+          <a:prstGeom prst="rect">
+            <a:avLst/>
+          </a:prstGeom>
+        </p:spPr>
+        <p:txBody>
+          <a:bodyPr/>
+          <a:lstStyle/>
+          <a:p>
+            <a:pPr marL="0" lvl="0" indent="0">
+              <a:buNone/>
+            </a:pPr>
+            <a:r>
+              <a:rPr lang="en-GB" dirty="0"/>
+              <a:t>General approach</a:t>
+            </a:r>
+            <a:endParaRPr dirty="0"/>
+          </a:p>
+        </p:txBody>
+      </p:sp>
+      <mc:AlternateContent xmlns:mc="http://schemas.openxmlformats.org/markup-compatibility/2006">
+        <mc:Choice xmlns:a14="http://schemas.microsoft.com/office/drawing/2010/main" Requires="a14">
+          <p:sp>
+            <p:nvSpPr>
+              <p:cNvPr id="3" name="Content Placeholder 2">
+                <a:extLst>
+                  <a:ext uri="{FF2B5EF4-FFF2-40B4-BE49-F238E27FC236}">
+                    <a16:creationId xmlns:a16="http://schemas.microsoft.com/office/drawing/2014/main" id="{8A5AC61D-1903-41EC-7C16-6979003C8655}"/>
+                  </a:ext>
+                </a:extLst>
+              </p:cNvPr>
+              <p:cNvSpPr>
+                <a:spLocks noGrp="1"/>
+              </p:cNvSpPr>
+              <p:nvPr>
+                <p:ph idx="1" hasCustomPrompt="1"/>
+              </p:nvPr>
+            </p:nvSpPr>
+            <p:spPr/>
+            <p:txBody>
+              <a:bodyPr/>
+              <a:lstStyle/>
+              <a:p>
+                <a:pPr marL="342991" lvl="1" indent="0">
+                  <a:buNone/>
+                </a:pPr>
+                <a:r>
+                  <a:rPr lang="en-GB" dirty="0"/>
+                  <a:t>Contact matrices – e.g. by age</a:t>
+                </a:r>
+              </a:p>
+              <a:p>
+                <a:pPr marL="342991" lvl="1" indent="0">
+                  <a:buNone/>
+                </a:pPr>
+                <a:endParaRPr lang="en-GB" dirty="0"/>
+              </a:p>
+              <a:p>
+                <a:pPr marL="342991" lvl="1" indent="0">
+                  <a:buNone/>
+                </a:pPr>
+                <a:endParaRPr lang="en-GB" dirty="0"/>
+              </a:p>
+              <a:p>
+                <a:pPr marL="342991" lvl="1" indent="0">
+                  <a:buNone/>
+                </a:pPr>
+                <a:endParaRPr lang="en-GB" dirty="0"/>
+              </a:p>
+              <a:p>
+                <a:pPr marL="342991" lvl="1" indent="0">
+                  <a:buNone/>
+                </a:pPr>
+                <a:endParaRPr lang="en-GB" dirty="0"/>
+              </a:p>
+              <a:p>
+                <a:pPr marL="342991" lvl="1" indent="0">
+                  <a:buNone/>
+                </a:pPr>
+                <a:endParaRPr lang="en-GB" dirty="0"/>
+              </a:p>
+              <a:p>
+                <a:pPr marL="342991" lvl="1" indent="0">
+                  <a:buNone/>
+                </a:pPr>
+                <a:r>
+                  <a:rPr lang="en-GB" dirty="0" err="1"/>
+                  <a:t>C</a:t>
+                </a:r>
+                <a:r>
+                  <a:rPr lang="en-GB" baseline="-25000" dirty="0" err="1"/>
+                  <a:t>ij</a:t>
+                </a:r>
+                <a:r>
+                  <a:rPr lang="en-GB" dirty="0"/>
+                  <a:t> = daily number of age-j individuals contacted by an age-</a:t>
+                </a:r>
+                <a:r>
+                  <a:rPr lang="en-GB" dirty="0" err="1"/>
+                  <a:t>i</a:t>
+                </a:r>
+                <a:r>
+                  <a:rPr lang="en-GB" dirty="0"/>
+                  <a:t> individual</a:t>
+                </a:r>
+              </a:p>
+              <a:p>
+                <a:pPr marL="342991" lvl="1" indent="0">
+                  <a:buNone/>
+                </a:pPr>
+                <a:endParaRPr lang="en-GB" baseline="-25000" dirty="0"/>
+              </a:p>
+              <a:p>
+                <a:pPr marL="342991" lvl="1" indent="0">
+                  <a:buNone/>
+                </a:pPr>
+                <a14:m>
+                  <m:oMathPara xmlns:m="http://schemas.openxmlformats.org/officeDocument/2006/math">
+                    <m:oMathParaPr>
+                      <m:jc m:val="centerGroup"/>
+                    </m:oMathParaPr>
+                    <m:oMath xmlns:m="http://schemas.openxmlformats.org/officeDocument/2006/math">
+                      <m:f>
+                        <m:fPr>
+                          <m:ctrlPr>
+                            <a:rPr lang="en-GB" b="0" i="1" smtClean="0">
+                              <a:latin typeface="Cambria Math" panose="02040503050406030204" pitchFamily="18" charset="0"/>
+                            </a:rPr>
+                          </m:ctrlPr>
+                        </m:fPr>
+                        <m:num>
+                          <m:r>
+                            <a:rPr lang="en-GB" b="0" i="1" smtClean="0">
+                              <a:latin typeface="Cambria Math" panose="02040503050406030204" pitchFamily="18" charset="0"/>
+                            </a:rPr>
+                            <m:t>𝑑</m:t>
+                          </m:r>
+                          <m:sSub>
+                            <m:sSubPr>
+                              <m:ctrlPr>
+                                <a:rPr lang="en-GB" b="0" i="1" smtClean="0">
+                                  <a:latin typeface="Cambria Math" panose="02040503050406030204" pitchFamily="18" charset="0"/>
+                                </a:rPr>
+                              </m:ctrlPr>
+                            </m:sSubPr>
+                            <m:e>
+                              <m:r>
+                                <a:rPr lang="en-GB" b="0" i="1" smtClean="0">
+                                  <a:latin typeface="Cambria Math" panose="02040503050406030204" pitchFamily="18" charset="0"/>
+                                </a:rPr>
+                                <m:t>𝑆</m:t>
+                              </m:r>
+                            </m:e>
+                            <m:sub>
+                              <m:r>
+                                <a:rPr lang="en-GB" b="0" i="1" smtClean="0">
+                                  <a:latin typeface="Cambria Math" panose="02040503050406030204" pitchFamily="18" charset="0"/>
+                                </a:rPr>
+                                <m:t>𝑖</m:t>
+                              </m:r>
+                            </m:sub>
+                          </m:sSub>
+                        </m:num>
+                        <m:den>
+                          <m:r>
+                            <a:rPr lang="en-GB" b="0" i="1" smtClean="0">
+                              <a:latin typeface="Cambria Math" panose="02040503050406030204" pitchFamily="18" charset="0"/>
+                            </a:rPr>
+                            <m:t>𝑑𝑡</m:t>
+                          </m:r>
+                        </m:den>
+                      </m:f>
+                      <m:r>
+                        <a:rPr lang="en-GB" b="0" i="1" smtClean="0">
+                          <a:latin typeface="Cambria Math" panose="02040503050406030204" pitchFamily="18" charset="0"/>
+                        </a:rPr>
+                        <m:t>=−</m:t>
+                      </m:r>
+                      <m:d>
+                        <m:dPr>
+                          <m:ctrlPr>
+                            <a:rPr lang="en-GB" b="0" i="1" smtClean="0">
+                              <a:latin typeface="Cambria Math" panose="02040503050406030204" pitchFamily="18" charset="0"/>
+                            </a:rPr>
+                          </m:ctrlPr>
+                        </m:dPr>
+                        <m:e>
+                          <m:nary>
+                            <m:naryPr>
+                              <m:chr m:val="∑"/>
+                              <m:supHide m:val="on"/>
+                              <m:ctrlPr>
+                                <a:rPr lang="en-GB" b="0" i="1" smtClean="0">
+                                  <a:latin typeface="Cambria Math" panose="02040503050406030204" pitchFamily="18" charset="0"/>
+                                </a:rPr>
+                              </m:ctrlPr>
+                            </m:naryPr>
+                            <m:sub>
+                              <m:r>
+                                <m:rPr>
+                                  <m:brk m:alnAt="7"/>
+                                </m:rPr>
+                                <a:rPr lang="en-GB" b="0" i="1" smtClean="0">
+                                  <a:latin typeface="Cambria Math" panose="02040503050406030204" pitchFamily="18" charset="0"/>
+                                </a:rPr>
+                                <m:t>𝑗</m:t>
+                              </m:r>
+                            </m:sub>
+                            <m:sup/>
+                            <m:e>
+                              <m:sSub>
+                                <m:sSubPr>
+                                  <m:ctrlPr>
+                                    <a:rPr lang="en-GB" i="1">
+                                      <a:latin typeface="Cambria Math" panose="02040503050406030204" pitchFamily="18" charset="0"/>
+                                    </a:rPr>
+                                  </m:ctrlPr>
+                                </m:sSubPr>
+                                <m:e>
+                                  <m:r>
+                                    <a:rPr lang="en-GB" i="1">
+                                      <a:latin typeface="Cambria Math" panose="02040503050406030204" pitchFamily="18" charset="0"/>
+                                    </a:rPr>
+                                    <m:t>𝑐</m:t>
+                                  </m:r>
+                                </m:e>
+                                <m:sub>
+                                  <m:r>
+                                    <a:rPr lang="en-GB" i="1">
+                                      <a:latin typeface="Cambria Math" panose="02040503050406030204" pitchFamily="18" charset="0"/>
+                                    </a:rPr>
+                                    <m:t>𝑖𝑗</m:t>
+                                  </m:r>
+                                </m:sub>
+                              </m:sSub>
+                              <m:f>
+                                <m:fPr>
+                                  <m:ctrlPr>
+                                    <a:rPr lang="en-GB" b="0" i="1" smtClean="0">
+                                      <a:latin typeface="Cambria Math" panose="02040503050406030204" pitchFamily="18" charset="0"/>
+                                    </a:rPr>
+                                  </m:ctrlPr>
+                                </m:fPr>
+                                <m:num>
+                                  <m:sSub>
+                                    <m:sSubPr>
+                                      <m:ctrlPr>
+                                        <a:rPr lang="en-GB" b="0" i="1" smtClean="0">
+                                          <a:latin typeface="Cambria Math" panose="02040503050406030204" pitchFamily="18" charset="0"/>
+                                        </a:rPr>
+                                      </m:ctrlPr>
+                                    </m:sSubPr>
+                                    <m:e>
+                                      <m:r>
+                                        <a:rPr lang="en-GB" b="0" i="1" smtClean="0">
+                                          <a:latin typeface="Cambria Math" panose="02040503050406030204" pitchFamily="18" charset="0"/>
+                                        </a:rPr>
+                                        <m:t>𝐼</m:t>
+                                      </m:r>
+                                    </m:e>
+                                    <m:sub>
+                                      <m:r>
+                                        <a:rPr lang="en-GB" b="0" i="1" smtClean="0">
+                                          <a:latin typeface="Cambria Math" panose="02040503050406030204" pitchFamily="18" charset="0"/>
+                                        </a:rPr>
+                                        <m:t>𝑗</m:t>
+                                      </m:r>
+                                    </m:sub>
+                                  </m:sSub>
+                                </m:num>
+                                <m:den>
+                                  <m:sSub>
+                                    <m:sSubPr>
+                                      <m:ctrlPr>
+                                        <a:rPr lang="en-GB" b="0" i="1" smtClean="0">
+                                          <a:latin typeface="Cambria Math" panose="02040503050406030204" pitchFamily="18" charset="0"/>
+                                        </a:rPr>
+                                      </m:ctrlPr>
+                                    </m:sSubPr>
+                                    <m:e>
+                                      <m:r>
+                                        <a:rPr lang="en-GB" b="0" i="1" smtClean="0">
+                                          <a:latin typeface="Cambria Math" panose="02040503050406030204" pitchFamily="18" charset="0"/>
+                                        </a:rPr>
+                                        <m:t>𝑁</m:t>
+                                      </m:r>
+                                    </m:e>
+                                    <m:sub>
+                                      <m:r>
+                                        <a:rPr lang="en-GB" b="0" i="1" smtClean="0">
+                                          <a:latin typeface="Cambria Math" panose="02040503050406030204" pitchFamily="18" charset="0"/>
+                                        </a:rPr>
+                                        <m:t>𝑗</m:t>
+                                      </m:r>
+                                    </m:sub>
+                                  </m:sSub>
+                                </m:den>
+                              </m:f>
+                            </m:e>
+                          </m:nary>
+                        </m:e>
+                      </m:d>
+                      <m:r>
+                        <a:rPr lang="en-GB" b="0" i="1" smtClean="0">
+                          <a:latin typeface="Cambria Math" panose="02040503050406030204" pitchFamily="18" charset="0"/>
+                        </a:rPr>
+                        <m:t>𝑝</m:t>
+                      </m:r>
+                      <m:sSub>
+                        <m:sSubPr>
+                          <m:ctrlPr>
+                            <a:rPr lang="en-GB" b="0" i="1" smtClean="0">
+                              <a:latin typeface="Cambria Math" panose="02040503050406030204" pitchFamily="18" charset="0"/>
+                            </a:rPr>
+                          </m:ctrlPr>
+                        </m:sSubPr>
+                        <m:e>
+                          <m:r>
+                            <a:rPr lang="en-GB" b="0" i="1" smtClean="0">
+                              <a:latin typeface="Cambria Math" panose="02040503050406030204" pitchFamily="18" charset="0"/>
+                            </a:rPr>
+                            <m:t>𝑆</m:t>
+                          </m:r>
+                        </m:e>
+                        <m:sub>
+                          <m:r>
+                            <a:rPr lang="en-GB" b="0" i="1" smtClean="0">
+                              <a:latin typeface="Cambria Math" panose="02040503050406030204" pitchFamily="18" charset="0"/>
+                            </a:rPr>
+                            <m:t>𝑖</m:t>
+                          </m:r>
+                        </m:sub>
+                      </m:sSub>
+                    </m:oMath>
+                  </m:oMathPara>
+                </a14:m>
+                <a:endParaRPr lang="en-GB" dirty="0"/>
+              </a:p>
+              <a:p>
+                <a:pPr marL="342991" lvl="1" indent="0">
+                  <a:buNone/>
+                </a:pPr>
+                <a14:m>
+                  <m:oMathPara xmlns:m="http://schemas.openxmlformats.org/officeDocument/2006/math">
+                    <m:oMathParaPr>
+                      <m:jc m:val="centerGroup"/>
+                    </m:oMathParaPr>
+                    <m:oMath xmlns:m="http://schemas.openxmlformats.org/officeDocument/2006/math">
+                      <m:f>
+                        <m:fPr>
+                          <m:ctrlPr>
+                            <a:rPr lang="en-GB" b="0" i="1" smtClean="0">
+                              <a:latin typeface="Cambria Math" panose="02040503050406030204" pitchFamily="18" charset="0"/>
+                            </a:rPr>
+                          </m:ctrlPr>
+                        </m:fPr>
+                        <m:num>
+                          <m:r>
+                            <a:rPr lang="en-GB" b="0" i="1" smtClean="0">
+                              <a:latin typeface="Cambria Math" panose="02040503050406030204" pitchFamily="18" charset="0"/>
+                            </a:rPr>
+                            <m:t>𝑑</m:t>
+                          </m:r>
+                          <m:sSub>
+                            <m:sSubPr>
+                              <m:ctrlPr>
+                                <a:rPr lang="en-GB" b="0" i="1" smtClean="0">
+                                  <a:latin typeface="Cambria Math" panose="02040503050406030204" pitchFamily="18" charset="0"/>
+                                </a:rPr>
+                              </m:ctrlPr>
+                            </m:sSubPr>
+                            <m:e>
+                              <m:r>
+                                <a:rPr lang="en-GB" b="0" i="1" smtClean="0">
+                                  <a:latin typeface="Cambria Math" panose="02040503050406030204" pitchFamily="18" charset="0"/>
+                                </a:rPr>
+                                <m:t>𝐼</m:t>
+                              </m:r>
+                            </m:e>
+                            <m:sub>
+                              <m:r>
+                                <a:rPr lang="en-GB" b="0" i="1" smtClean="0">
+                                  <a:latin typeface="Cambria Math" panose="02040503050406030204" pitchFamily="18" charset="0"/>
+                                </a:rPr>
+                                <m:t>𝑖</m:t>
+                              </m:r>
+                            </m:sub>
+                          </m:sSub>
+                        </m:num>
+                        <m:den>
+                          <m:r>
+                            <a:rPr lang="en-GB" b="0" i="1" smtClean="0">
+                              <a:latin typeface="Cambria Math" panose="02040503050406030204" pitchFamily="18" charset="0"/>
+                            </a:rPr>
+                            <m:t>𝑑𝑡</m:t>
+                          </m:r>
+                        </m:den>
+                      </m:f>
+                      <m:r>
+                        <a:rPr lang="en-GB" b="0" i="1" smtClean="0">
+                          <a:latin typeface="Cambria Math" panose="02040503050406030204" pitchFamily="18" charset="0"/>
+                        </a:rPr>
+                        <m:t>=</m:t>
+                      </m:r>
+                      <m:d>
+                        <m:dPr>
+                          <m:ctrlPr>
+                            <a:rPr lang="en-GB" b="0" i="1" smtClean="0">
+                              <a:latin typeface="Cambria Math" panose="02040503050406030204" pitchFamily="18" charset="0"/>
+                            </a:rPr>
+                          </m:ctrlPr>
+                        </m:dPr>
+                        <m:e>
+                          <m:nary>
+                            <m:naryPr>
+                              <m:chr m:val="∑"/>
+                              <m:supHide m:val="on"/>
+                              <m:ctrlPr>
+                                <a:rPr lang="en-GB" b="0" i="1" smtClean="0">
+                                  <a:latin typeface="Cambria Math" panose="02040503050406030204" pitchFamily="18" charset="0"/>
+                                </a:rPr>
+                              </m:ctrlPr>
+                            </m:naryPr>
+                            <m:sub>
+                              <m:r>
+                                <m:rPr>
+                                  <m:brk m:alnAt="7"/>
+                                </m:rPr>
+                                <a:rPr lang="en-GB" b="0" i="1" smtClean="0">
+                                  <a:latin typeface="Cambria Math" panose="02040503050406030204" pitchFamily="18" charset="0"/>
+                                </a:rPr>
+                                <m:t>𝑗</m:t>
+                              </m:r>
+                            </m:sub>
+                            <m:sup/>
+                            <m:e>
+                              <m:sSub>
+                                <m:sSubPr>
+                                  <m:ctrlPr>
+                                    <a:rPr lang="en-GB" i="1">
+                                      <a:latin typeface="Cambria Math" panose="02040503050406030204" pitchFamily="18" charset="0"/>
+                                    </a:rPr>
+                                  </m:ctrlPr>
+                                </m:sSubPr>
+                                <m:e>
+                                  <m:r>
+                                    <a:rPr lang="en-GB" i="1">
+                                      <a:latin typeface="Cambria Math" panose="02040503050406030204" pitchFamily="18" charset="0"/>
+                                    </a:rPr>
+                                    <m:t>𝑐</m:t>
+                                  </m:r>
+                                </m:e>
+                                <m:sub>
+                                  <m:r>
+                                    <a:rPr lang="en-GB" i="1">
+                                      <a:latin typeface="Cambria Math" panose="02040503050406030204" pitchFamily="18" charset="0"/>
+                                    </a:rPr>
+                                    <m:t>𝑖𝑗</m:t>
+                                  </m:r>
+                                </m:sub>
+                              </m:sSub>
+                              <m:f>
+                                <m:fPr>
+                                  <m:ctrlPr>
+                                    <a:rPr lang="en-GB" b="0" i="1" smtClean="0">
+                                      <a:latin typeface="Cambria Math" panose="02040503050406030204" pitchFamily="18" charset="0"/>
+                                    </a:rPr>
+                                  </m:ctrlPr>
+                                </m:fPr>
+                                <m:num>
+                                  <m:sSub>
+                                    <m:sSubPr>
+                                      <m:ctrlPr>
+                                        <a:rPr lang="en-GB" b="0" i="1" smtClean="0">
+                                          <a:latin typeface="Cambria Math" panose="02040503050406030204" pitchFamily="18" charset="0"/>
+                                        </a:rPr>
+                                      </m:ctrlPr>
+                                    </m:sSubPr>
+                                    <m:e>
+                                      <m:r>
+                                        <a:rPr lang="en-GB" b="0" i="1" smtClean="0">
+                                          <a:latin typeface="Cambria Math" panose="02040503050406030204" pitchFamily="18" charset="0"/>
+                                        </a:rPr>
+                                        <m:t>𝐼</m:t>
+                                      </m:r>
+                                    </m:e>
+                                    <m:sub>
+                                      <m:r>
+                                        <a:rPr lang="en-GB" b="0" i="1" smtClean="0">
+                                          <a:latin typeface="Cambria Math" panose="02040503050406030204" pitchFamily="18" charset="0"/>
+                                        </a:rPr>
+                                        <m:t>𝑗</m:t>
+                                      </m:r>
+                                    </m:sub>
+                                  </m:sSub>
+                                </m:num>
+                                <m:den>
+                                  <m:sSub>
+                                    <m:sSubPr>
+                                      <m:ctrlPr>
+                                        <a:rPr lang="en-GB" b="0" i="1" smtClean="0">
+                                          <a:latin typeface="Cambria Math" panose="02040503050406030204" pitchFamily="18" charset="0"/>
+                                        </a:rPr>
+                                      </m:ctrlPr>
+                                    </m:sSubPr>
+                                    <m:e>
+                                      <m:r>
+                                        <a:rPr lang="en-GB" b="0" i="1" smtClean="0">
+                                          <a:latin typeface="Cambria Math" panose="02040503050406030204" pitchFamily="18" charset="0"/>
+                                        </a:rPr>
+                                        <m:t>𝑁</m:t>
+                                      </m:r>
+                                    </m:e>
+                                    <m:sub>
+                                      <m:r>
+                                        <a:rPr lang="en-GB" b="0" i="1" smtClean="0">
+                                          <a:latin typeface="Cambria Math" panose="02040503050406030204" pitchFamily="18" charset="0"/>
+                                        </a:rPr>
+                                        <m:t>𝑗</m:t>
+                                      </m:r>
+                                    </m:sub>
+                                  </m:sSub>
+                                </m:den>
+                              </m:f>
+                            </m:e>
+                          </m:nary>
+                        </m:e>
+                      </m:d>
+                      <m:r>
+                        <a:rPr lang="en-GB" b="0" i="1" smtClean="0">
+                          <a:latin typeface="Cambria Math" panose="02040503050406030204" pitchFamily="18" charset="0"/>
+                        </a:rPr>
+                        <m:t>𝑝</m:t>
+                      </m:r>
+                      <m:sSub>
+                        <m:sSubPr>
+                          <m:ctrlPr>
+                            <a:rPr lang="en-GB" b="0" i="1" smtClean="0">
+                              <a:latin typeface="Cambria Math" panose="02040503050406030204" pitchFamily="18" charset="0"/>
+                            </a:rPr>
+                          </m:ctrlPr>
+                        </m:sSubPr>
+                        <m:e>
+                          <m:r>
+                            <a:rPr lang="en-GB" b="0" i="1" smtClean="0">
+                              <a:latin typeface="Cambria Math" panose="02040503050406030204" pitchFamily="18" charset="0"/>
+                            </a:rPr>
+                            <m:t>𝑆</m:t>
+                          </m:r>
+                        </m:e>
+                        <m:sub>
+                          <m:r>
+                            <a:rPr lang="en-GB" b="0" i="1" smtClean="0">
+                              <a:latin typeface="Cambria Math" panose="02040503050406030204" pitchFamily="18" charset="0"/>
+                            </a:rPr>
+                            <m:t>𝑖</m:t>
+                          </m:r>
+                        </m:sub>
+                      </m:sSub>
+                      <m:r>
+                        <a:rPr lang="en-GB" b="0" i="1" smtClean="0">
+                          <a:latin typeface="Cambria Math" panose="02040503050406030204" pitchFamily="18" charset="0"/>
+                        </a:rPr>
+                        <m:t>−</m:t>
+                      </m:r>
+                      <m:r>
+                        <a:rPr lang="en-GB" b="0" i="1" smtClean="0">
+                          <a:latin typeface="Cambria Math" panose="02040503050406030204" pitchFamily="18" charset="0"/>
+                        </a:rPr>
+                        <m:t>𝛾</m:t>
+                      </m:r>
+                      <m:sSub>
+                        <m:sSubPr>
+                          <m:ctrlPr>
+                            <a:rPr lang="en-GB" b="0" i="1" smtClean="0">
+                              <a:latin typeface="Cambria Math" panose="02040503050406030204" pitchFamily="18" charset="0"/>
+                            </a:rPr>
+                          </m:ctrlPr>
+                        </m:sSubPr>
+                        <m:e>
+                          <m:r>
+                            <a:rPr lang="en-GB" b="0" i="1" smtClean="0">
+                              <a:latin typeface="Cambria Math" panose="02040503050406030204" pitchFamily="18" charset="0"/>
+                            </a:rPr>
+                            <m:t>𝐼</m:t>
+                          </m:r>
+                        </m:e>
+                        <m:sub>
+                          <m:r>
+                            <a:rPr lang="en-GB" b="0" i="1" smtClean="0">
+                              <a:latin typeface="Cambria Math" panose="02040503050406030204" pitchFamily="18" charset="0"/>
+                            </a:rPr>
+                            <m:t>𝑖</m:t>
+                          </m:r>
+                        </m:sub>
+                      </m:sSub>
+                    </m:oMath>
+                  </m:oMathPara>
+                </a14:m>
+                <a:endParaRPr lang="en-GB" dirty="0"/>
+              </a:p>
+              <a:p>
+                <a:pPr marL="342991" lvl="1" indent="0" algn="ctr">
+                  <a:buNone/>
+                </a:pPr>
+                <a:r>
+                  <a:rPr lang="en-GB" dirty="0"/>
+                  <a:t>…</a:t>
+                </a:r>
+                <a:endParaRPr dirty="0"/>
+              </a:p>
+            </p:txBody>
+          </p:sp>
+        </mc:Choice>
+        <mc:Fallback>
+          <p:sp>
+            <p:nvSpPr>
+              <p:cNvPr id="3" name="Content Placeholder 2">
+                <a:extLst>
+                  <a:ext uri="{FF2B5EF4-FFF2-40B4-BE49-F238E27FC236}">
+                    <a16:creationId xmlns:a16="http://schemas.microsoft.com/office/drawing/2014/main" id="{8A5AC61D-1903-41EC-7C16-6979003C8655}"/>
+                  </a:ext>
+                </a:extLst>
+              </p:cNvPr>
+              <p:cNvSpPr>
+                <a:spLocks noGrp="1" noRot="1" noChangeAspect="1" noMove="1" noResize="1" noEditPoints="1" noAdjustHandles="1" noChangeArrowheads="1" noChangeShapeType="1" noTextEdit="1"/>
+              </p:cNvSpPr>
+              <p:nvPr>
+                <p:ph idx="1" hasCustomPrompt="1"/>
+              </p:nvPr>
+            </p:nvSpPr>
+            <p:spPr>
+              <a:blipFill>
+                <a:blip r:embed="rId2"/>
+                <a:stretch>
+                  <a:fillRect t="-789" b="-27368"/>
+                </a:stretch>
+              </a:blipFill>
+            </p:spPr>
+            <p:txBody>
+              <a:bodyPr/>
+              <a:lstStyle/>
+              <a:p>
+                <a:r>
+                  <a:rPr lang="en-GB">
+                    <a:noFill/>
+                  </a:rPr>
+                  <a:t> </a:t>
+                </a:r>
+              </a:p>
+            </p:txBody>
+          </p:sp>
+        </mc:Fallback>
+      </mc:AlternateContent>
+      <p:graphicFrame>
+        <p:nvGraphicFramePr>
+          <p:cNvPr id="2" name="Table 1">
+            <a:extLst>
+              <a:ext uri="{FF2B5EF4-FFF2-40B4-BE49-F238E27FC236}">
+                <a16:creationId xmlns:a16="http://schemas.microsoft.com/office/drawing/2014/main" id="{AD1FD276-368F-D8FD-6372-1EDE0703CFA4}"/>
+              </a:ext>
+            </a:extLst>
+          </p:cNvPr>
+          <p:cNvGraphicFramePr>
+            <a:graphicFrameLocks noGrp="1"/>
+          </p:cNvGraphicFramePr>
+          <p:nvPr>
+            <p:extLst>
+              <p:ext uri="{D42A27DB-BD31-4B8C-83A1-F6EECF244321}">
+                <p14:modId xmlns:p14="http://schemas.microsoft.com/office/powerpoint/2010/main" val="3818527895"/>
+              </p:ext>
+            </p:extLst>
+          </p:nvPr>
+        </p:nvGraphicFramePr>
+        <p:xfrm>
+          <a:off x="1812021" y="2021141"/>
+          <a:ext cx="4583184" cy="1483360"/>
+        </p:xfrm>
+        <a:graphic>
+          <a:graphicData uri="http://schemas.openxmlformats.org/drawingml/2006/table">
+            <a:tbl>
+              <a:tblPr firstRow="1" bandRow="1">
+                <a:tableStyleId>{2D5ABB26-0587-4C30-8999-92F81FD0307C}</a:tableStyleId>
+              </a:tblPr>
+              <a:tblGrid>
+                <a:gridCol w="1145796">
+                  <a:extLst>
+                    <a:ext uri="{9D8B030D-6E8A-4147-A177-3AD203B41FA5}">
+                      <a16:colId xmlns:a16="http://schemas.microsoft.com/office/drawing/2014/main" val="479737932"/>
+                    </a:ext>
+                  </a:extLst>
+                </a:gridCol>
+                <a:gridCol w="1145796">
+                  <a:extLst>
+                    <a:ext uri="{9D8B030D-6E8A-4147-A177-3AD203B41FA5}">
+                      <a16:colId xmlns:a16="http://schemas.microsoft.com/office/drawing/2014/main" val="371933656"/>
+                    </a:ext>
+                  </a:extLst>
+                </a:gridCol>
+                <a:gridCol w="1145796">
+                  <a:extLst>
+                    <a:ext uri="{9D8B030D-6E8A-4147-A177-3AD203B41FA5}">
+                      <a16:colId xmlns:a16="http://schemas.microsoft.com/office/drawing/2014/main" val="1218017702"/>
+                    </a:ext>
+                  </a:extLst>
+                </a:gridCol>
+                <a:gridCol w="1145796">
+                  <a:extLst>
+                    <a:ext uri="{9D8B030D-6E8A-4147-A177-3AD203B41FA5}">
+                      <a16:colId xmlns:a16="http://schemas.microsoft.com/office/drawing/2014/main" val="1237160152"/>
+                    </a:ext>
+                  </a:extLst>
+                </a:gridCol>
+              </a:tblGrid>
+              <a:tr h="370840">
+                <a:tc>
+                  <a:txBody>
+                    <a:bodyPr/>
+                    <a:lstStyle/>
+                    <a:p>
+                      <a:endParaRPr lang="en-GB" dirty="0"/>
+                    </a:p>
+                  </a:txBody>
+                  <a:tcPr>
+                    <a:lnL w="12700" cap="flat" cmpd="sng" algn="ctr">
+                      <a:solidFill>
+                        <a:schemeClr val="tx1"/>
+                      </a:solidFill>
+                      <a:prstDash val="solid"/>
+                      <a:round/>
+                      <a:headEnd type="none" w="med" len="med"/>
+                      <a:tailEnd type="none" w="med" len="med"/>
+                    </a:lnL>
+                    <a:lnR w="12700" cap="flat" cmpd="sng" algn="ctr">
+                      <a:solidFill>
+                        <a:schemeClr val="tx1"/>
+                      </a:solidFill>
+                      <a:prstDash val="solid"/>
+                      <a:round/>
+                      <a:headEnd type="none" w="med" len="med"/>
+                      <a:tailEnd type="none" w="med" len="med"/>
+                    </a:lnR>
+                    <a:lnT w="12700" cap="flat" cmpd="sng" algn="ctr">
+                      <a:solidFill>
+                        <a:schemeClr val="tx1"/>
+                      </a:solidFill>
+                      <a:prstDash val="solid"/>
+                      <a:round/>
+                      <a:headEnd type="none" w="med" len="med"/>
+                      <a:tailEnd type="none" w="med" len="med"/>
+                    </a:lnT>
+                    <a:lnB w="12700" cap="flat" cmpd="sng" algn="ctr">
+                      <a:solidFill>
+                        <a:schemeClr val="tx1"/>
+                      </a:solidFill>
+                      <a:prstDash val="solid"/>
+                      <a:round/>
+                      <a:headEnd type="none" w="med" len="med"/>
+                      <a:tailEnd type="none" w="med" len="med"/>
+                    </a:lnB>
+                  </a:tcPr>
+                </a:tc>
+                <a:tc>
+                  <a:txBody>
+                    <a:bodyPr/>
+                    <a:lstStyle/>
+                    <a:p>
+                      <a:r>
+                        <a:rPr lang="en-GB" dirty="0"/>
+                        <a:t>0-4</a:t>
+                      </a:r>
+                    </a:p>
+                  </a:txBody>
+                  <a:tcPr>
+                    <a:lnL w="12700" cap="flat" cmpd="sng" algn="ctr">
+                      <a:solidFill>
+                        <a:schemeClr val="tx1"/>
+                      </a:solidFill>
+                      <a:prstDash val="solid"/>
+                      <a:round/>
+                      <a:headEnd type="none" w="med" len="med"/>
+                      <a:tailEnd type="none" w="med" len="med"/>
+                    </a:lnL>
+                    <a:lnR w="12700" cap="flat" cmpd="sng" algn="ctr">
+                      <a:solidFill>
+                        <a:schemeClr val="tx1"/>
+                      </a:solidFill>
+                      <a:prstDash val="solid"/>
+                      <a:round/>
+                      <a:headEnd type="none" w="med" len="med"/>
+                      <a:tailEnd type="none" w="med" len="med"/>
+                    </a:lnR>
+                    <a:lnT w="12700" cap="flat" cmpd="sng" algn="ctr">
+                      <a:solidFill>
+                        <a:schemeClr val="tx1"/>
+                      </a:solidFill>
+                      <a:prstDash val="solid"/>
+                      <a:round/>
+                      <a:headEnd type="none" w="med" len="med"/>
+                      <a:tailEnd type="none" w="med" len="med"/>
+                    </a:lnT>
+                    <a:lnB w="12700" cap="flat" cmpd="sng" algn="ctr">
+                      <a:solidFill>
+                        <a:schemeClr val="tx1"/>
+                      </a:solidFill>
+                      <a:prstDash val="solid"/>
+                      <a:round/>
+                      <a:headEnd type="none" w="med" len="med"/>
+                      <a:tailEnd type="none" w="med" len="med"/>
+                    </a:lnB>
+                  </a:tcPr>
+                </a:tc>
+                <a:tc>
+                  <a:txBody>
+                    <a:bodyPr/>
+                    <a:lstStyle/>
+                    <a:p>
+                      <a:r>
+                        <a:rPr lang="en-GB" dirty="0"/>
+                        <a:t>5-9</a:t>
+                      </a:r>
+                    </a:p>
+                  </a:txBody>
+                  <a:tcPr>
+                    <a:lnL w="12700" cap="flat" cmpd="sng" algn="ctr">
+                      <a:solidFill>
+                        <a:schemeClr val="tx1"/>
+                      </a:solidFill>
+                      <a:prstDash val="solid"/>
+                      <a:round/>
+                      <a:headEnd type="none" w="med" len="med"/>
+                      <a:tailEnd type="none" w="med" len="med"/>
+                    </a:lnL>
+                    <a:lnR w="12700" cap="flat" cmpd="sng" algn="ctr">
+                      <a:solidFill>
+                        <a:schemeClr val="tx1"/>
+                      </a:solidFill>
+                      <a:prstDash val="solid"/>
+                      <a:round/>
+                      <a:headEnd type="none" w="med" len="med"/>
+                      <a:tailEnd type="none" w="med" len="med"/>
+                    </a:lnR>
+                    <a:lnT w="12700" cap="flat" cmpd="sng" algn="ctr">
+                      <a:solidFill>
+                        <a:schemeClr val="tx1"/>
+                      </a:solidFill>
+                      <a:prstDash val="solid"/>
+                      <a:round/>
+                      <a:headEnd type="none" w="med" len="med"/>
+                      <a:tailEnd type="none" w="med" len="med"/>
+                    </a:lnT>
+                    <a:lnB w="12700" cap="flat" cmpd="sng" algn="ctr">
+                      <a:solidFill>
+                        <a:schemeClr val="tx1"/>
+                      </a:solidFill>
+                      <a:prstDash val="solid"/>
+                      <a:round/>
+                      <a:headEnd type="none" w="med" len="med"/>
+                      <a:tailEnd type="none" w="med" len="med"/>
+                    </a:lnB>
+                  </a:tcPr>
+                </a:tc>
+                <a:tc>
+                  <a:txBody>
+                    <a:bodyPr/>
+                    <a:lstStyle/>
+                    <a:p>
+                      <a:r>
+                        <a:rPr lang="en-GB" dirty="0"/>
+                        <a:t>10-14</a:t>
+                      </a:r>
+                    </a:p>
+                  </a:txBody>
+                  <a:tcPr>
+                    <a:lnL w="12700" cap="flat" cmpd="sng" algn="ctr">
+                      <a:solidFill>
+                        <a:schemeClr val="tx1"/>
+                      </a:solidFill>
+                      <a:prstDash val="solid"/>
+                      <a:round/>
+                      <a:headEnd type="none" w="med" len="med"/>
+                      <a:tailEnd type="none" w="med" len="med"/>
+                    </a:lnL>
+                    <a:lnR w="12700" cap="flat" cmpd="sng" algn="ctr">
+                      <a:solidFill>
+                        <a:schemeClr val="tx1"/>
+                      </a:solidFill>
+                      <a:prstDash val="solid"/>
+                      <a:round/>
+                      <a:headEnd type="none" w="med" len="med"/>
+                      <a:tailEnd type="none" w="med" len="med"/>
+                    </a:lnR>
+                    <a:lnT w="12700" cap="flat" cmpd="sng" algn="ctr">
+                      <a:solidFill>
+                        <a:schemeClr val="tx1"/>
+                      </a:solidFill>
+                      <a:prstDash val="solid"/>
+                      <a:round/>
+                      <a:headEnd type="none" w="med" len="med"/>
+                      <a:tailEnd type="none" w="med" len="med"/>
+                    </a:lnT>
+                    <a:lnB w="12700" cap="flat" cmpd="sng" algn="ctr">
+                      <a:solidFill>
+                        <a:schemeClr val="tx1"/>
+                      </a:solidFill>
+                      <a:prstDash val="solid"/>
+                      <a:round/>
+                      <a:headEnd type="none" w="med" len="med"/>
+                      <a:tailEnd type="none" w="med" len="med"/>
+                    </a:lnB>
+                  </a:tcPr>
+                </a:tc>
+                <a:extLst>
+                  <a:ext uri="{0D108BD9-81ED-4DB2-BD59-A6C34878D82A}">
+                    <a16:rowId xmlns:a16="http://schemas.microsoft.com/office/drawing/2014/main" val="28624677"/>
+                  </a:ext>
+                </a:extLst>
+              </a:tr>
+              <a:tr h="370840">
+                <a:tc>
+                  <a:txBody>
+                    <a:bodyPr/>
+                    <a:lstStyle/>
+                    <a:p>
+                      <a:r>
+                        <a:rPr lang="en-GB" dirty="0"/>
+                        <a:t>0-4</a:t>
+                      </a:r>
+                    </a:p>
+                  </a:txBody>
+                  <a:tcPr>
+                    <a:lnL w="12700" cap="flat" cmpd="sng" algn="ctr">
+                      <a:solidFill>
+                        <a:schemeClr val="tx1"/>
+                      </a:solidFill>
+                      <a:prstDash val="solid"/>
+                      <a:round/>
+                      <a:headEnd type="none" w="med" len="med"/>
+                      <a:tailEnd type="none" w="med" len="med"/>
+                    </a:lnL>
+                    <a:lnR w="12700" cap="flat" cmpd="sng" algn="ctr">
+                      <a:solidFill>
+                        <a:schemeClr val="tx1"/>
+                      </a:solidFill>
+                      <a:prstDash val="solid"/>
+                      <a:round/>
+                      <a:headEnd type="none" w="med" len="med"/>
+                      <a:tailEnd type="none" w="med" len="med"/>
+                    </a:lnR>
+                    <a:lnT w="12700" cap="flat" cmpd="sng" algn="ctr">
+                      <a:solidFill>
+                        <a:schemeClr val="tx1"/>
+                      </a:solidFill>
+                      <a:prstDash val="solid"/>
+                      <a:round/>
+                      <a:headEnd type="none" w="med" len="med"/>
+                      <a:tailEnd type="none" w="med" len="med"/>
+                    </a:lnT>
+                    <a:lnB w="12700" cap="flat" cmpd="sng" algn="ctr">
+                      <a:solidFill>
+                        <a:schemeClr val="tx1"/>
+                      </a:solidFill>
+                      <a:prstDash val="solid"/>
+                      <a:round/>
+                      <a:headEnd type="none" w="med" len="med"/>
+                      <a:tailEnd type="none" w="med" len="med"/>
+                    </a:lnB>
+                  </a:tcPr>
+                </a:tc>
+                <a:tc>
+                  <a:txBody>
+                    <a:bodyPr/>
+                    <a:lstStyle/>
+                    <a:p>
+                      <a:r>
+                        <a:rPr lang="en-GB" dirty="0"/>
+                        <a:t>4.1</a:t>
+                      </a:r>
+                    </a:p>
+                  </a:txBody>
+                  <a:tcPr>
+                    <a:lnL w="12700" cap="flat" cmpd="sng" algn="ctr">
+                      <a:solidFill>
+                        <a:schemeClr val="tx1"/>
+                      </a:solidFill>
+                      <a:prstDash val="solid"/>
+                      <a:round/>
+                      <a:headEnd type="none" w="med" len="med"/>
+                      <a:tailEnd type="none" w="med" len="med"/>
+                    </a:lnL>
+                    <a:lnR w="12700" cap="flat" cmpd="sng" algn="ctr">
+                      <a:solidFill>
+                        <a:schemeClr val="tx1"/>
+                      </a:solidFill>
+                      <a:prstDash val="solid"/>
+                      <a:round/>
+                      <a:headEnd type="none" w="med" len="med"/>
+                      <a:tailEnd type="none" w="med" len="med"/>
+                    </a:lnR>
+                    <a:lnT w="12700" cap="flat" cmpd="sng" algn="ctr">
+                      <a:solidFill>
+                        <a:schemeClr val="tx1"/>
+                      </a:solidFill>
+                      <a:prstDash val="solid"/>
+                      <a:round/>
+                      <a:headEnd type="none" w="med" len="med"/>
+                      <a:tailEnd type="none" w="med" len="med"/>
+                    </a:lnT>
+                    <a:lnB w="12700" cap="flat" cmpd="sng" algn="ctr">
+                      <a:solidFill>
+                        <a:schemeClr val="tx1"/>
+                      </a:solidFill>
+                      <a:prstDash val="solid"/>
+                      <a:round/>
+                      <a:headEnd type="none" w="med" len="med"/>
+                      <a:tailEnd type="none" w="med" len="med"/>
+                    </a:lnB>
+                  </a:tcPr>
+                </a:tc>
+                <a:tc>
+                  <a:txBody>
+                    <a:bodyPr/>
+                    <a:lstStyle/>
+                    <a:p>
+                      <a:r>
+                        <a:rPr lang="en-GB" dirty="0"/>
+                        <a:t>1.8</a:t>
+                      </a:r>
+                    </a:p>
+                  </a:txBody>
+                  <a:tcPr>
+                    <a:lnL w="12700" cap="flat" cmpd="sng" algn="ctr">
+                      <a:solidFill>
+                        <a:schemeClr val="tx1"/>
+                      </a:solidFill>
+                      <a:prstDash val="solid"/>
+                      <a:round/>
+                      <a:headEnd type="none" w="med" len="med"/>
+                      <a:tailEnd type="none" w="med" len="med"/>
+                    </a:lnL>
+                    <a:lnR w="12700" cap="flat" cmpd="sng" algn="ctr">
+                      <a:solidFill>
+                        <a:schemeClr val="tx1"/>
+                      </a:solidFill>
+                      <a:prstDash val="solid"/>
+                      <a:round/>
+                      <a:headEnd type="none" w="med" len="med"/>
+                      <a:tailEnd type="none" w="med" len="med"/>
+                    </a:lnR>
+                    <a:lnT w="12700" cap="flat" cmpd="sng" algn="ctr">
+                      <a:solidFill>
+                        <a:schemeClr val="tx1"/>
+                      </a:solidFill>
+                      <a:prstDash val="solid"/>
+                      <a:round/>
+                      <a:headEnd type="none" w="med" len="med"/>
+                      <a:tailEnd type="none" w="med" len="med"/>
+                    </a:lnT>
+                    <a:lnB w="12700" cap="flat" cmpd="sng" algn="ctr">
+                      <a:solidFill>
+                        <a:schemeClr val="tx1"/>
+                      </a:solidFill>
+                      <a:prstDash val="solid"/>
+                      <a:round/>
+                      <a:headEnd type="none" w="med" len="med"/>
+                      <a:tailEnd type="none" w="med" len="med"/>
+                    </a:lnB>
+                  </a:tcPr>
+                </a:tc>
+                <a:tc>
+                  <a:txBody>
+                    <a:bodyPr/>
+                    <a:lstStyle/>
+                    <a:p>
+                      <a:r>
+                        <a:rPr lang="en-GB" dirty="0"/>
+                        <a:t>0.7</a:t>
+                      </a:r>
+                    </a:p>
+                  </a:txBody>
+                  <a:tcPr>
+                    <a:lnL w="12700" cap="flat" cmpd="sng" algn="ctr">
+                      <a:solidFill>
+                        <a:schemeClr val="tx1"/>
+                      </a:solidFill>
+                      <a:prstDash val="solid"/>
+                      <a:round/>
+                      <a:headEnd type="none" w="med" len="med"/>
+                      <a:tailEnd type="none" w="med" len="med"/>
+                    </a:lnL>
+                    <a:lnR w="12700" cap="flat" cmpd="sng" algn="ctr">
+                      <a:solidFill>
+                        <a:schemeClr val="tx1"/>
+                      </a:solidFill>
+                      <a:prstDash val="solid"/>
+                      <a:round/>
+                      <a:headEnd type="none" w="med" len="med"/>
+                      <a:tailEnd type="none" w="med" len="med"/>
+                    </a:lnR>
+                    <a:lnT w="12700" cap="flat" cmpd="sng" algn="ctr">
+                      <a:solidFill>
+                        <a:schemeClr val="tx1"/>
+                      </a:solidFill>
+                      <a:prstDash val="solid"/>
+                      <a:round/>
+                      <a:headEnd type="none" w="med" len="med"/>
+                      <a:tailEnd type="none" w="med" len="med"/>
+                    </a:lnT>
+                    <a:lnB w="12700" cap="flat" cmpd="sng" algn="ctr">
+                      <a:solidFill>
+                        <a:schemeClr val="tx1"/>
+                      </a:solidFill>
+                      <a:prstDash val="solid"/>
+                      <a:round/>
+                      <a:headEnd type="none" w="med" len="med"/>
+                      <a:tailEnd type="none" w="med" len="med"/>
+                    </a:lnB>
+                  </a:tcPr>
+                </a:tc>
+                <a:extLst>
+                  <a:ext uri="{0D108BD9-81ED-4DB2-BD59-A6C34878D82A}">
+                    <a16:rowId xmlns:a16="http://schemas.microsoft.com/office/drawing/2014/main" val="3560837935"/>
+                  </a:ext>
+                </a:extLst>
+              </a:tr>
+              <a:tr h="370840">
+                <a:tc>
+                  <a:txBody>
+                    <a:bodyPr/>
+                    <a:lstStyle/>
+                    <a:p>
+                      <a:r>
+                        <a:rPr lang="en-GB" dirty="0"/>
+                        <a:t>5-9</a:t>
+                      </a:r>
+                    </a:p>
+                  </a:txBody>
+                  <a:tcPr>
+                    <a:lnL w="12700" cap="flat" cmpd="sng" algn="ctr">
+                      <a:solidFill>
+                        <a:schemeClr val="tx1"/>
+                      </a:solidFill>
+                      <a:prstDash val="solid"/>
+                      <a:round/>
+                      <a:headEnd type="none" w="med" len="med"/>
+                      <a:tailEnd type="none" w="med" len="med"/>
+                    </a:lnL>
+                    <a:lnR w="12700" cap="flat" cmpd="sng" algn="ctr">
+                      <a:solidFill>
+                        <a:schemeClr val="tx1"/>
+                      </a:solidFill>
+                      <a:prstDash val="solid"/>
+                      <a:round/>
+                      <a:headEnd type="none" w="med" len="med"/>
+                      <a:tailEnd type="none" w="med" len="med"/>
+                    </a:lnR>
+                    <a:lnT w="12700" cap="flat" cmpd="sng" algn="ctr">
+                      <a:solidFill>
+                        <a:schemeClr val="tx1"/>
+                      </a:solidFill>
+                      <a:prstDash val="solid"/>
+                      <a:round/>
+                      <a:headEnd type="none" w="med" len="med"/>
+                      <a:tailEnd type="none" w="med" len="med"/>
+                    </a:lnT>
+                    <a:lnB w="12700" cap="flat" cmpd="sng" algn="ctr">
+                      <a:solidFill>
+                        <a:schemeClr val="tx1"/>
+                      </a:solidFill>
+                      <a:prstDash val="solid"/>
+                      <a:round/>
+                      <a:headEnd type="none" w="med" len="med"/>
+                      <a:tailEnd type="none" w="med" len="med"/>
+                    </a:lnB>
+                  </a:tcPr>
+                </a:tc>
+                <a:tc>
+                  <a:txBody>
+                    <a:bodyPr/>
+                    <a:lstStyle/>
+                    <a:p>
+                      <a:r>
+                        <a:rPr lang="en-GB" dirty="0"/>
+                        <a:t>1.2</a:t>
+                      </a:r>
+                    </a:p>
+                  </a:txBody>
+                  <a:tcPr>
+                    <a:lnL w="12700" cap="flat" cmpd="sng" algn="ctr">
+                      <a:solidFill>
+                        <a:schemeClr val="tx1"/>
+                      </a:solidFill>
+                      <a:prstDash val="solid"/>
+                      <a:round/>
+                      <a:headEnd type="none" w="med" len="med"/>
+                      <a:tailEnd type="none" w="med" len="med"/>
+                    </a:lnL>
+                    <a:lnR w="12700" cap="flat" cmpd="sng" algn="ctr">
+                      <a:solidFill>
+                        <a:schemeClr val="tx1"/>
+                      </a:solidFill>
+                      <a:prstDash val="solid"/>
+                      <a:round/>
+                      <a:headEnd type="none" w="med" len="med"/>
+                      <a:tailEnd type="none" w="med" len="med"/>
+                    </a:lnR>
+                    <a:lnT w="12700" cap="flat" cmpd="sng" algn="ctr">
+                      <a:solidFill>
+                        <a:schemeClr val="tx1"/>
+                      </a:solidFill>
+                      <a:prstDash val="solid"/>
+                      <a:round/>
+                      <a:headEnd type="none" w="med" len="med"/>
+                      <a:tailEnd type="none" w="med" len="med"/>
+                    </a:lnT>
+                    <a:lnB w="12700" cap="flat" cmpd="sng" algn="ctr">
+                      <a:solidFill>
+                        <a:schemeClr val="tx1"/>
+                      </a:solidFill>
+                      <a:prstDash val="solid"/>
+                      <a:round/>
+                      <a:headEnd type="none" w="med" len="med"/>
+                      <a:tailEnd type="none" w="med" len="med"/>
+                    </a:lnB>
+                  </a:tcPr>
+                </a:tc>
+                <a:tc>
+                  <a:txBody>
+                    <a:bodyPr/>
+                    <a:lstStyle/>
+                    <a:p>
+                      <a:r>
+                        <a:rPr lang="en-GB" dirty="0"/>
+                        <a:t>5.6</a:t>
+                      </a:r>
+                    </a:p>
+                  </a:txBody>
+                  <a:tcPr>
+                    <a:lnL w="12700" cap="flat" cmpd="sng" algn="ctr">
+                      <a:solidFill>
+                        <a:schemeClr val="tx1"/>
+                      </a:solidFill>
+                      <a:prstDash val="solid"/>
+                      <a:round/>
+                      <a:headEnd type="none" w="med" len="med"/>
+                      <a:tailEnd type="none" w="med" len="med"/>
+                    </a:lnL>
+                    <a:lnR w="12700" cap="flat" cmpd="sng" algn="ctr">
+                      <a:solidFill>
+                        <a:schemeClr val="tx1"/>
+                      </a:solidFill>
+                      <a:prstDash val="solid"/>
+                      <a:round/>
+                      <a:headEnd type="none" w="med" len="med"/>
+                      <a:tailEnd type="none" w="med" len="med"/>
+                    </a:lnR>
+                    <a:lnT w="12700" cap="flat" cmpd="sng" algn="ctr">
+                      <a:solidFill>
+                        <a:schemeClr val="tx1"/>
+                      </a:solidFill>
+                      <a:prstDash val="solid"/>
+                      <a:round/>
+                      <a:headEnd type="none" w="med" len="med"/>
+                      <a:tailEnd type="none" w="med" len="med"/>
+                    </a:lnT>
+                    <a:lnB w="12700" cap="flat" cmpd="sng" algn="ctr">
+                      <a:solidFill>
+                        <a:schemeClr val="tx1"/>
+                      </a:solidFill>
+                      <a:prstDash val="solid"/>
+                      <a:round/>
+                      <a:headEnd type="none" w="med" len="med"/>
+                      <a:tailEnd type="none" w="med" len="med"/>
+                    </a:lnB>
+                  </a:tcPr>
+                </a:tc>
+                <a:tc>
+                  <a:txBody>
+                    <a:bodyPr/>
+                    <a:lstStyle/>
+                    <a:p>
+                      <a:r>
+                        <a:rPr lang="en-GB" dirty="0"/>
+                        <a:t>1.2</a:t>
+                      </a:r>
+                    </a:p>
+                  </a:txBody>
+                  <a:tcPr>
+                    <a:lnL w="12700" cap="flat" cmpd="sng" algn="ctr">
+                      <a:solidFill>
+                        <a:schemeClr val="tx1"/>
+                      </a:solidFill>
+                      <a:prstDash val="solid"/>
+                      <a:round/>
+                      <a:headEnd type="none" w="med" len="med"/>
+                      <a:tailEnd type="none" w="med" len="med"/>
+                    </a:lnL>
+                    <a:lnR w="12700" cap="flat" cmpd="sng" algn="ctr">
+                      <a:solidFill>
+                        <a:schemeClr val="tx1"/>
+                      </a:solidFill>
+                      <a:prstDash val="solid"/>
+                      <a:round/>
+                      <a:headEnd type="none" w="med" len="med"/>
+                      <a:tailEnd type="none" w="med" len="med"/>
+                    </a:lnR>
+                    <a:lnT w="12700" cap="flat" cmpd="sng" algn="ctr">
+                      <a:solidFill>
+                        <a:schemeClr val="tx1"/>
+                      </a:solidFill>
+                      <a:prstDash val="solid"/>
+                      <a:round/>
+                      <a:headEnd type="none" w="med" len="med"/>
+                      <a:tailEnd type="none" w="med" len="med"/>
+                    </a:lnT>
+                    <a:lnB w="12700" cap="flat" cmpd="sng" algn="ctr">
+                      <a:solidFill>
+                        <a:schemeClr val="tx1"/>
+                      </a:solidFill>
+                      <a:prstDash val="solid"/>
+                      <a:round/>
+                      <a:headEnd type="none" w="med" len="med"/>
+                      <a:tailEnd type="none" w="med" len="med"/>
+                    </a:lnB>
+                  </a:tcPr>
+                </a:tc>
+                <a:extLst>
+                  <a:ext uri="{0D108BD9-81ED-4DB2-BD59-A6C34878D82A}">
+                    <a16:rowId xmlns:a16="http://schemas.microsoft.com/office/drawing/2014/main" val="85029971"/>
+                  </a:ext>
+                </a:extLst>
+              </a:tr>
+              <a:tr h="370840">
+                <a:tc>
+                  <a:txBody>
+                    <a:bodyPr/>
+                    <a:lstStyle/>
+                    <a:p>
+                      <a:r>
+                        <a:rPr lang="en-GB" dirty="0"/>
+                        <a:t>10-14</a:t>
+                      </a:r>
+                    </a:p>
+                  </a:txBody>
+                  <a:tcPr>
+                    <a:lnL w="12700" cap="flat" cmpd="sng" algn="ctr">
+                      <a:solidFill>
+                        <a:schemeClr val="tx1"/>
+                      </a:solidFill>
+                      <a:prstDash val="solid"/>
+                      <a:round/>
+                      <a:headEnd type="none" w="med" len="med"/>
+                      <a:tailEnd type="none" w="med" len="med"/>
+                    </a:lnL>
+                    <a:lnR w="12700" cap="flat" cmpd="sng" algn="ctr">
+                      <a:solidFill>
+                        <a:schemeClr val="tx1"/>
+                      </a:solidFill>
+                      <a:prstDash val="solid"/>
+                      <a:round/>
+                      <a:headEnd type="none" w="med" len="med"/>
+                      <a:tailEnd type="none" w="med" len="med"/>
+                    </a:lnR>
+                    <a:lnT w="12700" cap="flat" cmpd="sng" algn="ctr">
+                      <a:solidFill>
+                        <a:schemeClr val="tx1"/>
+                      </a:solidFill>
+                      <a:prstDash val="solid"/>
+                      <a:round/>
+                      <a:headEnd type="none" w="med" len="med"/>
+                      <a:tailEnd type="none" w="med" len="med"/>
+                    </a:lnT>
+                    <a:lnB w="12700" cap="flat" cmpd="sng" algn="ctr">
+                      <a:solidFill>
+                        <a:schemeClr val="tx1"/>
+                      </a:solidFill>
+                      <a:prstDash val="solid"/>
+                      <a:round/>
+                      <a:headEnd type="none" w="med" len="med"/>
+                      <a:tailEnd type="none" w="med" len="med"/>
+                    </a:lnB>
+                  </a:tcPr>
+                </a:tc>
+                <a:tc>
+                  <a:txBody>
+                    <a:bodyPr/>
+                    <a:lstStyle/>
+                    <a:p>
+                      <a:r>
+                        <a:rPr lang="en-GB" dirty="0"/>
+                        <a:t>0.8</a:t>
+                      </a:r>
+                    </a:p>
+                  </a:txBody>
+                  <a:tcPr>
+                    <a:lnL w="12700" cap="flat" cmpd="sng" algn="ctr">
+                      <a:solidFill>
+                        <a:schemeClr val="tx1"/>
+                      </a:solidFill>
+                      <a:prstDash val="solid"/>
+                      <a:round/>
+                      <a:headEnd type="none" w="med" len="med"/>
+                      <a:tailEnd type="none" w="med" len="med"/>
+                    </a:lnL>
+                    <a:lnR w="12700" cap="flat" cmpd="sng" algn="ctr">
+                      <a:solidFill>
+                        <a:schemeClr val="tx1"/>
+                      </a:solidFill>
+                      <a:prstDash val="solid"/>
+                      <a:round/>
+                      <a:headEnd type="none" w="med" len="med"/>
+                      <a:tailEnd type="none" w="med" len="med"/>
+                    </a:lnR>
+                    <a:lnT w="12700" cap="flat" cmpd="sng" algn="ctr">
+                      <a:solidFill>
+                        <a:schemeClr val="tx1"/>
+                      </a:solidFill>
+                      <a:prstDash val="solid"/>
+                      <a:round/>
+                      <a:headEnd type="none" w="med" len="med"/>
+                      <a:tailEnd type="none" w="med" len="med"/>
+                    </a:lnT>
+                    <a:lnB w="12700" cap="flat" cmpd="sng" algn="ctr">
+                      <a:solidFill>
+                        <a:schemeClr val="tx1"/>
+                      </a:solidFill>
+                      <a:prstDash val="solid"/>
+                      <a:round/>
+                      <a:headEnd type="none" w="med" len="med"/>
+                      <a:tailEnd type="none" w="med" len="med"/>
+                    </a:lnB>
+                  </a:tcPr>
+                </a:tc>
+                <a:tc>
+                  <a:txBody>
+                    <a:bodyPr/>
+                    <a:lstStyle/>
+                    <a:p>
+                      <a:r>
+                        <a:rPr lang="en-GB" dirty="0"/>
+                        <a:t>0.9</a:t>
+                      </a:r>
+                    </a:p>
+                  </a:txBody>
+                  <a:tcPr>
+                    <a:lnL w="12700" cap="flat" cmpd="sng" algn="ctr">
+                      <a:solidFill>
+                        <a:schemeClr val="tx1"/>
+                      </a:solidFill>
+                      <a:prstDash val="solid"/>
+                      <a:round/>
+                      <a:headEnd type="none" w="med" len="med"/>
+                      <a:tailEnd type="none" w="med" len="med"/>
+                    </a:lnL>
+                    <a:lnR w="12700" cap="flat" cmpd="sng" algn="ctr">
+                      <a:solidFill>
+                        <a:schemeClr val="tx1"/>
+                      </a:solidFill>
+                      <a:prstDash val="solid"/>
+                      <a:round/>
+                      <a:headEnd type="none" w="med" len="med"/>
+                      <a:tailEnd type="none" w="med" len="med"/>
+                    </a:lnR>
+                    <a:lnT w="12700" cap="flat" cmpd="sng" algn="ctr">
+                      <a:solidFill>
+                        <a:schemeClr val="tx1"/>
+                      </a:solidFill>
+                      <a:prstDash val="solid"/>
+                      <a:round/>
+                      <a:headEnd type="none" w="med" len="med"/>
+                      <a:tailEnd type="none" w="med" len="med"/>
+                    </a:lnT>
+                    <a:lnB w="12700" cap="flat" cmpd="sng" algn="ctr">
+                      <a:solidFill>
+                        <a:schemeClr val="tx1"/>
+                      </a:solidFill>
+                      <a:prstDash val="solid"/>
+                      <a:round/>
+                      <a:headEnd type="none" w="med" len="med"/>
+                      <a:tailEnd type="none" w="med" len="med"/>
+                    </a:lnB>
+                  </a:tcPr>
+                </a:tc>
+                <a:tc>
+                  <a:txBody>
+                    <a:bodyPr/>
+                    <a:lstStyle/>
+                    <a:p>
+                      <a:r>
+                        <a:rPr lang="en-GB" dirty="0"/>
+                        <a:t>7.8</a:t>
+                      </a:r>
+                    </a:p>
+                  </a:txBody>
+                  <a:tcPr>
+                    <a:lnL w="12700" cap="flat" cmpd="sng" algn="ctr">
+                      <a:solidFill>
+                        <a:schemeClr val="tx1"/>
+                      </a:solidFill>
+                      <a:prstDash val="solid"/>
+                      <a:round/>
+                      <a:headEnd type="none" w="med" len="med"/>
+                      <a:tailEnd type="none" w="med" len="med"/>
+                    </a:lnL>
+                    <a:lnR w="12700" cap="flat" cmpd="sng" algn="ctr">
+                      <a:solidFill>
+                        <a:schemeClr val="tx1"/>
+                      </a:solidFill>
+                      <a:prstDash val="solid"/>
+                      <a:round/>
+                      <a:headEnd type="none" w="med" len="med"/>
+                      <a:tailEnd type="none" w="med" len="med"/>
+                    </a:lnR>
+                    <a:lnT w="12700" cap="flat" cmpd="sng" algn="ctr">
+                      <a:solidFill>
+                        <a:schemeClr val="tx1"/>
+                      </a:solidFill>
+                      <a:prstDash val="solid"/>
+                      <a:round/>
+                      <a:headEnd type="none" w="med" len="med"/>
+                      <a:tailEnd type="none" w="med" len="med"/>
+                    </a:lnT>
+                    <a:lnB w="12700" cap="flat" cmpd="sng" algn="ctr">
+                      <a:solidFill>
+                        <a:schemeClr val="tx1"/>
+                      </a:solidFill>
+                      <a:prstDash val="solid"/>
+                      <a:round/>
+                      <a:headEnd type="none" w="med" len="med"/>
+                      <a:tailEnd type="none" w="med" len="med"/>
+                    </a:lnB>
+                  </a:tcPr>
+                </a:tc>
+                <a:extLst>
+                  <a:ext uri="{0D108BD9-81ED-4DB2-BD59-A6C34878D82A}">
+                    <a16:rowId xmlns:a16="http://schemas.microsoft.com/office/drawing/2014/main" val="4189700572"/>
+                  </a:ext>
+                </a:extLst>
+              </a:tr>
+            </a:tbl>
+          </a:graphicData>
+        </a:graphic>
+      </p:graphicFrame>
+    </p:spTree>
+    <p:extLst>
+      <p:ext uri="{BB962C8B-B14F-4D97-AF65-F5344CB8AC3E}">
+        <p14:creationId xmlns:p14="http://schemas.microsoft.com/office/powerpoint/2010/main" val="1878840010"/>
+      </p:ext>
+    </p:extLst>
+  </p:cSld>
+  <p:clrMapOvr>
+    <a:masterClrMapping/>
+  </p:clrMapOvr>
+</p:sld>
+</file>
+
+<file path=ppt/slides/slide13.xml><?xml version="1.0" encoding="utf-8"?>
+<p:sld xmlns:a="http://schemas.openxmlformats.org/drawingml/2006/main" xmlns:r="http://schemas.openxmlformats.org/officeDocument/2006/relationships" xmlns:p="http://schemas.openxmlformats.org/presentationml/2006/main">
+  <p:cSld>
+    <p:spTree>
+      <p:nvGrpSpPr>
+        <p:cNvPr id="1" name="">
+          <a:extLst>
+            <a:ext uri="{FF2B5EF4-FFF2-40B4-BE49-F238E27FC236}">
+              <a16:creationId xmlns:a16="http://schemas.microsoft.com/office/drawing/2014/main" id="{A23AEAEC-4558-6F17-2F9A-47453F1F1071}"/>
+            </a:ext>
+          </a:extLst>
+        </p:cNvPr>
+        <p:cNvGrpSpPr/>
+        <p:nvPr/>
+      </p:nvGrpSpPr>
+      <p:grpSpPr>
+        <a:xfrm>
+          <a:off x="0" y="0"/>
+          <a:ext cx="0" cy="0"/>
+          <a:chOff x="0" y="0"/>
+          <a:chExt cx="0" cy="0"/>
+        </a:xfrm>
+      </p:grpSpPr>
+      <p:sp>
+        <p:nvSpPr>
+          <p:cNvPr id="5" name="Title 1">
+            <a:extLst>
+              <a:ext uri="{FF2B5EF4-FFF2-40B4-BE49-F238E27FC236}">
+                <a16:creationId xmlns:a16="http://schemas.microsoft.com/office/drawing/2014/main" id="{44E6A96B-9431-AA8C-19AE-5E47F2EBE650}"/>
+              </a:ext>
+            </a:extLst>
+          </p:cNvPr>
+          <p:cNvSpPr>
+            <a:spLocks noGrp="1"/>
+          </p:cNvSpPr>
+          <p:nvPr>
+            <p:ph type="title" hasCustomPrompt="1"/>
+          </p:nvPr>
+        </p:nvSpPr>
+        <p:spPr>
+          <a:xfrm>
+            <a:off x="457201" y="279132"/>
+            <a:ext cx="6705600" cy="623236"/>
+          </a:xfrm>
+          <a:prstGeom prst="rect">
+            <a:avLst/>
+          </a:prstGeom>
+        </p:spPr>
+        <p:txBody>
+          <a:bodyPr/>
+          <a:lstStyle/>
+          <a:p>
+            <a:pPr marL="0" lvl="0" indent="0">
+              <a:buNone/>
+            </a:pPr>
+            <a:r>
+              <a:rPr lang="en-GB" dirty="0"/>
+              <a:t>General approach</a:t>
+            </a:r>
+            <a:endParaRPr dirty="0"/>
+          </a:p>
+        </p:txBody>
+      </p:sp>
+      <p:sp>
+        <p:nvSpPr>
+          <p:cNvPr id="3" name="Content Placeholder 2">
+            <a:extLst>
+              <a:ext uri="{FF2B5EF4-FFF2-40B4-BE49-F238E27FC236}">
+                <a16:creationId xmlns:a16="http://schemas.microsoft.com/office/drawing/2014/main" id="{25C6A09F-B377-AE37-EF58-B36D722A3E45}"/>
+              </a:ext>
+            </a:extLst>
+          </p:cNvPr>
+          <p:cNvSpPr>
+            <a:spLocks noGrp="1"/>
+          </p:cNvSpPr>
+          <p:nvPr>
+            <p:ph idx="1" hasCustomPrompt="1"/>
+          </p:nvPr>
+        </p:nvSpPr>
+        <p:spPr/>
+        <p:txBody>
+          <a:bodyPr/>
+          <a:lstStyle/>
+          <a:p>
+            <a:pPr marL="342991" lvl="1" indent="0">
+              <a:buNone/>
+            </a:pPr>
+            <a:r>
+              <a:rPr lang="en-GB" dirty="0"/>
+              <a:t>Contact matrices – e.g. by age</a:t>
+            </a:r>
+          </a:p>
+          <a:p>
+            <a:pPr marL="342991" lvl="1" indent="0">
+              <a:buNone/>
+            </a:pPr>
+            <a:endParaRPr lang="en-GB" dirty="0"/>
+          </a:p>
+          <a:p>
+            <a:pPr marL="342991" lvl="1" indent="0">
+              <a:buNone/>
+            </a:pPr>
+            <a:endParaRPr lang="en-GB" dirty="0"/>
+          </a:p>
+          <a:p>
+            <a:pPr marL="342991" lvl="1" indent="0">
+              <a:buNone/>
+            </a:pPr>
+            <a:endParaRPr lang="en-GB" dirty="0"/>
+          </a:p>
+          <a:p>
+            <a:pPr marL="342991" lvl="1" indent="0">
+              <a:buNone/>
+            </a:pPr>
+            <a:endParaRPr lang="en-GB" dirty="0"/>
+          </a:p>
+          <a:p>
+            <a:pPr marL="342991" lvl="1" indent="0">
+              <a:buNone/>
+            </a:pPr>
+            <a:endParaRPr lang="en-GB" dirty="0"/>
+          </a:p>
+          <a:p>
+            <a:pPr marL="342991" lvl="1" indent="0">
+              <a:buNone/>
+            </a:pPr>
+            <a:r>
+              <a:rPr lang="en-GB" dirty="0"/>
+              <a:t>A question that often comes up… why isn’t this matrix symmetrical about the diagonal? Is it supposed to be?</a:t>
+            </a:r>
+          </a:p>
+          <a:p>
+            <a:pPr marL="342991" lvl="1" indent="0">
+              <a:buNone/>
+            </a:pPr>
+            <a:endParaRPr lang="en-GB" dirty="0"/>
+          </a:p>
+          <a:p>
+            <a:pPr marL="342991" lvl="1" indent="0">
+              <a:buNone/>
+            </a:pPr>
+            <a:r>
+              <a:rPr lang="en-GB" dirty="0"/>
+              <a:t>To see why it doesn’t need to be, consider contact rates among a group of friends with these ages:</a:t>
+            </a:r>
+          </a:p>
+          <a:p>
+            <a:pPr marL="342991" lvl="1" indent="0">
+              <a:buNone/>
+            </a:pPr>
+            <a:r>
+              <a:rPr lang="en-GB" dirty="0"/>
+              <a:t>		(20-29)	(20-29)	</a:t>
+            </a:r>
+            <a:r>
+              <a:rPr lang="en-GB"/>
+              <a:t>(30-39</a:t>
+            </a:r>
+            <a:r>
+              <a:rPr lang="en-GB" dirty="0"/>
+              <a:t>)</a:t>
+            </a:r>
+            <a:endParaRPr dirty="0"/>
+          </a:p>
+        </p:txBody>
+      </p:sp>
+      <p:graphicFrame>
+        <p:nvGraphicFramePr>
+          <p:cNvPr id="2" name="Table 1">
+            <a:extLst>
+              <a:ext uri="{FF2B5EF4-FFF2-40B4-BE49-F238E27FC236}">
+                <a16:creationId xmlns:a16="http://schemas.microsoft.com/office/drawing/2014/main" id="{446DA963-22D0-3931-302E-D2039269E34A}"/>
+              </a:ext>
+            </a:extLst>
+          </p:cNvPr>
+          <p:cNvGraphicFramePr>
+            <a:graphicFrameLocks noGrp="1"/>
+          </p:cNvGraphicFramePr>
+          <p:nvPr>
+            <p:extLst>
+              <p:ext uri="{D42A27DB-BD31-4B8C-83A1-F6EECF244321}">
+                <p14:modId xmlns:p14="http://schemas.microsoft.com/office/powerpoint/2010/main" val="727171992"/>
+              </p:ext>
+            </p:extLst>
+          </p:nvPr>
+        </p:nvGraphicFramePr>
+        <p:xfrm>
+          <a:off x="1812021" y="2021141"/>
+          <a:ext cx="4583184" cy="1483360"/>
+        </p:xfrm>
+        <a:graphic>
+          <a:graphicData uri="http://schemas.openxmlformats.org/drawingml/2006/table">
+            <a:tbl>
+              <a:tblPr firstRow="1" bandRow="1">
+                <a:tableStyleId>{2D5ABB26-0587-4C30-8999-92F81FD0307C}</a:tableStyleId>
+              </a:tblPr>
+              <a:tblGrid>
+                <a:gridCol w="1145796">
+                  <a:extLst>
+                    <a:ext uri="{9D8B030D-6E8A-4147-A177-3AD203B41FA5}">
+                      <a16:colId xmlns:a16="http://schemas.microsoft.com/office/drawing/2014/main" val="479737932"/>
+                    </a:ext>
+                  </a:extLst>
+                </a:gridCol>
+                <a:gridCol w="1145796">
+                  <a:extLst>
+                    <a:ext uri="{9D8B030D-6E8A-4147-A177-3AD203B41FA5}">
+                      <a16:colId xmlns:a16="http://schemas.microsoft.com/office/drawing/2014/main" val="371933656"/>
+                    </a:ext>
+                  </a:extLst>
+                </a:gridCol>
+                <a:gridCol w="1145796">
+                  <a:extLst>
+                    <a:ext uri="{9D8B030D-6E8A-4147-A177-3AD203B41FA5}">
+                      <a16:colId xmlns:a16="http://schemas.microsoft.com/office/drawing/2014/main" val="1218017702"/>
+                    </a:ext>
+                  </a:extLst>
+                </a:gridCol>
+                <a:gridCol w="1145796">
+                  <a:extLst>
+                    <a:ext uri="{9D8B030D-6E8A-4147-A177-3AD203B41FA5}">
+                      <a16:colId xmlns:a16="http://schemas.microsoft.com/office/drawing/2014/main" val="1237160152"/>
+                    </a:ext>
+                  </a:extLst>
+                </a:gridCol>
+              </a:tblGrid>
+              <a:tr h="370840">
+                <a:tc>
+                  <a:txBody>
+                    <a:bodyPr/>
+                    <a:lstStyle/>
+                    <a:p>
+                      <a:endParaRPr lang="en-GB" dirty="0"/>
+                    </a:p>
+                  </a:txBody>
+                  <a:tcPr>
+                    <a:lnL w="12700" cap="flat" cmpd="sng" algn="ctr">
+                      <a:solidFill>
+                        <a:schemeClr val="tx1"/>
+                      </a:solidFill>
+                      <a:prstDash val="solid"/>
+                      <a:round/>
+                      <a:headEnd type="none" w="med" len="med"/>
+                      <a:tailEnd type="none" w="med" len="med"/>
+                    </a:lnL>
+                    <a:lnR w="12700" cap="flat" cmpd="sng" algn="ctr">
+                      <a:solidFill>
+                        <a:schemeClr val="tx1"/>
+                      </a:solidFill>
+                      <a:prstDash val="solid"/>
+                      <a:round/>
+                      <a:headEnd type="none" w="med" len="med"/>
+                      <a:tailEnd type="none" w="med" len="med"/>
+                    </a:lnR>
+                    <a:lnT w="12700" cap="flat" cmpd="sng" algn="ctr">
+                      <a:solidFill>
+                        <a:schemeClr val="tx1"/>
+                      </a:solidFill>
+                      <a:prstDash val="solid"/>
+                      <a:round/>
+                      <a:headEnd type="none" w="med" len="med"/>
+                      <a:tailEnd type="none" w="med" len="med"/>
+                    </a:lnT>
+                    <a:lnB w="12700" cap="flat" cmpd="sng" algn="ctr">
+                      <a:solidFill>
+                        <a:schemeClr val="tx1"/>
+                      </a:solidFill>
+                      <a:prstDash val="solid"/>
+                      <a:round/>
+                      <a:headEnd type="none" w="med" len="med"/>
+                      <a:tailEnd type="none" w="med" len="med"/>
+                    </a:lnB>
+                  </a:tcPr>
+                </a:tc>
+                <a:tc>
+                  <a:txBody>
+                    <a:bodyPr/>
+                    <a:lstStyle/>
+                    <a:p>
+                      <a:r>
+                        <a:rPr lang="en-GB" dirty="0"/>
+                        <a:t>0-4</a:t>
+                      </a:r>
+                    </a:p>
+                  </a:txBody>
+                  <a:tcPr>
+                    <a:lnL w="12700" cap="flat" cmpd="sng" algn="ctr">
+                      <a:solidFill>
+                        <a:schemeClr val="tx1"/>
+                      </a:solidFill>
+                      <a:prstDash val="solid"/>
+                      <a:round/>
+                      <a:headEnd type="none" w="med" len="med"/>
+                      <a:tailEnd type="none" w="med" len="med"/>
+                    </a:lnL>
+                    <a:lnR w="12700" cap="flat" cmpd="sng" algn="ctr">
+                      <a:solidFill>
+                        <a:schemeClr val="tx1"/>
+                      </a:solidFill>
+                      <a:prstDash val="solid"/>
+                      <a:round/>
+                      <a:headEnd type="none" w="med" len="med"/>
+                      <a:tailEnd type="none" w="med" len="med"/>
+                    </a:lnR>
+                    <a:lnT w="12700" cap="flat" cmpd="sng" algn="ctr">
+                      <a:solidFill>
+                        <a:schemeClr val="tx1"/>
+                      </a:solidFill>
+                      <a:prstDash val="solid"/>
+                      <a:round/>
+                      <a:headEnd type="none" w="med" len="med"/>
+                      <a:tailEnd type="none" w="med" len="med"/>
+                    </a:lnT>
+                    <a:lnB w="12700" cap="flat" cmpd="sng" algn="ctr">
+                      <a:solidFill>
+                        <a:schemeClr val="tx1"/>
+                      </a:solidFill>
+                      <a:prstDash val="solid"/>
+                      <a:round/>
+                      <a:headEnd type="none" w="med" len="med"/>
+                      <a:tailEnd type="none" w="med" len="med"/>
+                    </a:lnB>
+                  </a:tcPr>
+                </a:tc>
+                <a:tc>
+                  <a:txBody>
+                    <a:bodyPr/>
+                    <a:lstStyle/>
+                    <a:p>
+                      <a:r>
+                        <a:rPr lang="en-GB" dirty="0"/>
+                        <a:t>5-9</a:t>
+                      </a:r>
+                    </a:p>
+                  </a:txBody>
+                  <a:tcPr>
+                    <a:lnL w="12700" cap="flat" cmpd="sng" algn="ctr">
+                      <a:solidFill>
+                        <a:schemeClr val="tx1"/>
+                      </a:solidFill>
+                      <a:prstDash val="solid"/>
+                      <a:round/>
+                      <a:headEnd type="none" w="med" len="med"/>
+                      <a:tailEnd type="none" w="med" len="med"/>
+                    </a:lnL>
+                    <a:lnR w="12700" cap="flat" cmpd="sng" algn="ctr">
+                      <a:solidFill>
+                        <a:schemeClr val="tx1"/>
+                      </a:solidFill>
+                      <a:prstDash val="solid"/>
+                      <a:round/>
+                      <a:headEnd type="none" w="med" len="med"/>
+                      <a:tailEnd type="none" w="med" len="med"/>
+                    </a:lnR>
+                    <a:lnT w="12700" cap="flat" cmpd="sng" algn="ctr">
+                      <a:solidFill>
+                        <a:schemeClr val="tx1"/>
+                      </a:solidFill>
+                      <a:prstDash val="solid"/>
+                      <a:round/>
+                      <a:headEnd type="none" w="med" len="med"/>
+                      <a:tailEnd type="none" w="med" len="med"/>
+                    </a:lnT>
+                    <a:lnB w="12700" cap="flat" cmpd="sng" algn="ctr">
+                      <a:solidFill>
+                        <a:schemeClr val="tx1"/>
+                      </a:solidFill>
+                      <a:prstDash val="solid"/>
+                      <a:round/>
+                      <a:headEnd type="none" w="med" len="med"/>
+                      <a:tailEnd type="none" w="med" len="med"/>
+                    </a:lnB>
+                  </a:tcPr>
+                </a:tc>
+                <a:tc>
+                  <a:txBody>
+                    <a:bodyPr/>
+                    <a:lstStyle/>
+                    <a:p>
+                      <a:r>
+                        <a:rPr lang="en-GB" dirty="0"/>
+                        <a:t>10-14</a:t>
+                      </a:r>
+                    </a:p>
+                  </a:txBody>
+                  <a:tcPr>
+                    <a:lnL w="12700" cap="flat" cmpd="sng" algn="ctr">
+                      <a:solidFill>
+                        <a:schemeClr val="tx1"/>
+                      </a:solidFill>
+                      <a:prstDash val="solid"/>
+                      <a:round/>
+                      <a:headEnd type="none" w="med" len="med"/>
+                      <a:tailEnd type="none" w="med" len="med"/>
+                    </a:lnL>
+                    <a:lnR w="12700" cap="flat" cmpd="sng" algn="ctr">
+                      <a:solidFill>
+                        <a:schemeClr val="tx1"/>
+                      </a:solidFill>
+                      <a:prstDash val="solid"/>
+                      <a:round/>
+                      <a:headEnd type="none" w="med" len="med"/>
+                      <a:tailEnd type="none" w="med" len="med"/>
+                    </a:lnR>
+                    <a:lnT w="12700" cap="flat" cmpd="sng" algn="ctr">
+                      <a:solidFill>
+                        <a:schemeClr val="tx1"/>
+                      </a:solidFill>
+                      <a:prstDash val="solid"/>
+                      <a:round/>
+                      <a:headEnd type="none" w="med" len="med"/>
+                      <a:tailEnd type="none" w="med" len="med"/>
+                    </a:lnT>
+                    <a:lnB w="12700" cap="flat" cmpd="sng" algn="ctr">
+                      <a:solidFill>
+                        <a:schemeClr val="tx1"/>
+                      </a:solidFill>
+                      <a:prstDash val="solid"/>
+                      <a:round/>
+                      <a:headEnd type="none" w="med" len="med"/>
+                      <a:tailEnd type="none" w="med" len="med"/>
+                    </a:lnB>
+                  </a:tcPr>
+                </a:tc>
+                <a:extLst>
+                  <a:ext uri="{0D108BD9-81ED-4DB2-BD59-A6C34878D82A}">
+                    <a16:rowId xmlns:a16="http://schemas.microsoft.com/office/drawing/2014/main" val="28624677"/>
+                  </a:ext>
+                </a:extLst>
+              </a:tr>
+              <a:tr h="370840">
+                <a:tc>
+                  <a:txBody>
+                    <a:bodyPr/>
+                    <a:lstStyle/>
+                    <a:p>
+                      <a:r>
+                        <a:rPr lang="en-GB" dirty="0"/>
+                        <a:t>0-4</a:t>
+                      </a:r>
+                    </a:p>
+                  </a:txBody>
+                  <a:tcPr>
+                    <a:lnL w="12700" cap="flat" cmpd="sng" algn="ctr">
+                      <a:solidFill>
+                        <a:schemeClr val="tx1"/>
+                      </a:solidFill>
+                      <a:prstDash val="solid"/>
+                      <a:round/>
+                      <a:headEnd type="none" w="med" len="med"/>
+                      <a:tailEnd type="none" w="med" len="med"/>
+                    </a:lnL>
+                    <a:lnR w="12700" cap="flat" cmpd="sng" algn="ctr">
+                      <a:solidFill>
+                        <a:schemeClr val="tx1"/>
+                      </a:solidFill>
+                      <a:prstDash val="solid"/>
+                      <a:round/>
+                      <a:headEnd type="none" w="med" len="med"/>
+                      <a:tailEnd type="none" w="med" len="med"/>
+                    </a:lnR>
+                    <a:lnT w="12700" cap="flat" cmpd="sng" algn="ctr">
+                      <a:solidFill>
+                        <a:schemeClr val="tx1"/>
+                      </a:solidFill>
+                      <a:prstDash val="solid"/>
+                      <a:round/>
+                      <a:headEnd type="none" w="med" len="med"/>
+                      <a:tailEnd type="none" w="med" len="med"/>
+                    </a:lnT>
+                    <a:lnB w="12700" cap="flat" cmpd="sng" algn="ctr">
+                      <a:solidFill>
+                        <a:schemeClr val="tx1"/>
+                      </a:solidFill>
+                      <a:prstDash val="solid"/>
+                      <a:round/>
+                      <a:headEnd type="none" w="med" len="med"/>
+                      <a:tailEnd type="none" w="med" len="med"/>
+                    </a:lnB>
+                  </a:tcPr>
+                </a:tc>
+                <a:tc>
+                  <a:txBody>
+                    <a:bodyPr/>
+                    <a:lstStyle/>
+                    <a:p>
+                      <a:r>
+                        <a:rPr lang="en-GB" dirty="0"/>
+                        <a:t>4.1</a:t>
+                      </a:r>
+                    </a:p>
+                  </a:txBody>
+                  <a:tcPr>
+                    <a:lnL w="12700" cap="flat" cmpd="sng" algn="ctr">
+                      <a:solidFill>
+                        <a:schemeClr val="tx1"/>
+                      </a:solidFill>
+                      <a:prstDash val="solid"/>
+                      <a:round/>
+                      <a:headEnd type="none" w="med" len="med"/>
+                      <a:tailEnd type="none" w="med" len="med"/>
+                    </a:lnL>
+                    <a:lnR w="12700" cap="flat" cmpd="sng" algn="ctr">
+                      <a:solidFill>
+                        <a:schemeClr val="tx1"/>
+                      </a:solidFill>
+                      <a:prstDash val="solid"/>
+                      <a:round/>
+                      <a:headEnd type="none" w="med" len="med"/>
+                      <a:tailEnd type="none" w="med" len="med"/>
+                    </a:lnR>
+                    <a:lnT w="12700" cap="flat" cmpd="sng" algn="ctr">
+                      <a:solidFill>
+                        <a:schemeClr val="tx1"/>
+                      </a:solidFill>
+                      <a:prstDash val="solid"/>
+                      <a:round/>
+                      <a:headEnd type="none" w="med" len="med"/>
+                      <a:tailEnd type="none" w="med" len="med"/>
+                    </a:lnT>
+                    <a:lnB w="12700" cap="flat" cmpd="sng" algn="ctr">
+                      <a:solidFill>
+                        <a:schemeClr val="tx1"/>
+                      </a:solidFill>
+                      <a:prstDash val="solid"/>
+                      <a:round/>
+                      <a:headEnd type="none" w="med" len="med"/>
+                      <a:tailEnd type="none" w="med" len="med"/>
+                    </a:lnB>
+                  </a:tcPr>
+                </a:tc>
+                <a:tc>
+                  <a:txBody>
+                    <a:bodyPr/>
+                    <a:lstStyle/>
+                    <a:p>
+                      <a:r>
+                        <a:rPr lang="en-GB" dirty="0"/>
+                        <a:t>1.8</a:t>
+                      </a:r>
+                    </a:p>
+                  </a:txBody>
+                  <a:tcPr>
+                    <a:lnL w="12700" cap="flat" cmpd="sng" algn="ctr">
+                      <a:solidFill>
+                        <a:schemeClr val="tx1"/>
+                      </a:solidFill>
+                      <a:prstDash val="solid"/>
+                      <a:round/>
+                      <a:headEnd type="none" w="med" len="med"/>
+                      <a:tailEnd type="none" w="med" len="med"/>
+                    </a:lnL>
+                    <a:lnR w="12700" cap="flat" cmpd="sng" algn="ctr">
+                      <a:solidFill>
+                        <a:schemeClr val="tx1"/>
+                      </a:solidFill>
+                      <a:prstDash val="solid"/>
+                      <a:round/>
+                      <a:headEnd type="none" w="med" len="med"/>
+                      <a:tailEnd type="none" w="med" len="med"/>
+                    </a:lnR>
+                    <a:lnT w="12700" cap="flat" cmpd="sng" algn="ctr">
+                      <a:solidFill>
+                        <a:schemeClr val="tx1"/>
+                      </a:solidFill>
+                      <a:prstDash val="solid"/>
+                      <a:round/>
+                      <a:headEnd type="none" w="med" len="med"/>
+                      <a:tailEnd type="none" w="med" len="med"/>
+                    </a:lnT>
+                    <a:lnB w="12700" cap="flat" cmpd="sng" algn="ctr">
+                      <a:solidFill>
+                        <a:schemeClr val="tx1"/>
+                      </a:solidFill>
+                      <a:prstDash val="solid"/>
+                      <a:round/>
+                      <a:headEnd type="none" w="med" len="med"/>
+                      <a:tailEnd type="none" w="med" len="med"/>
+                    </a:lnB>
+                  </a:tcPr>
+                </a:tc>
+                <a:tc>
+                  <a:txBody>
+                    <a:bodyPr/>
+                    <a:lstStyle/>
+                    <a:p>
+                      <a:r>
+                        <a:rPr lang="en-GB" dirty="0"/>
+                        <a:t>0.7</a:t>
+                      </a:r>
+                    </a:p>
+                  </a:txBody>
+                  <a:tcPr>
+                    <a:lnL w="12700" cap="flat" cmpd="sng" algn="ctr">
+                      <a:solidFill>
+                        <a:schemeClr val="tx1"/>
+                      </a:solidFill>
+                      <a:prstDash val="solid"/>
+                      <a:round/>
+                      <a:headEnd type="none" w="med" len="med"/>
+                      <a:tailEnd type="none" w="med" len="med"/>
+                    </a:lnL>
+                    <a:lnR w="12700" cap="flat" cmpd="sng" algn="ctr">
+                      <a:solidFill>
+                        <a:schemeClr val="tx1"/>
+                      </a:solidFill>
+                      <a:prstDash val="solid"/>
+                      <a:round/>
+                      <a:headEnd type="none" w="med" len="med"/>
+                      <a:tailEnd type="none" w="med" len="med"/>
+                    </a:lnR>
+                    <a:lnT w="12700" cap="flat" cmpd="sng" algn="ctr">
+                      <a:solidFill>
+                        <a:schemeClr val="tx1"/>
+                      </a:solidFill>
+                      <a:prstDash val="solid"/>
+                      <a:round/>
+                      <a:headEnd type="none" w="med" len="med"/>
+                      <a:tailEnd type="none" w="med" len="med"/>
+                    </a:lnT>
+                    <a:lnB w="12700" cap="flat" cmpd="sng" algn="ctr">
+                      <a:solidFill>
+                        <a:schemeClr val="tx1"/>
+                      </a:solidFill>
+                      <a:prstDash val="solid"/>
+                      <a:round/>
+                      <a:headEnd type="none" w="med" len="med"/>
+                      <a:tailEnd type="none" w="med" len="med"/>
+                    </a:lnB>
+                  </a:tcPr>
+                </a:tc>
+                <a:extLst>
+                  <a:ext uri="{0D108BD9-81ED-4DB2-BD59-A6C34878D82A}">
+                    <a16:rowId xmlns:a16="http://schemas.microsoft.com/office/drawing/2014/main" val="3560837935"/>
+                  </a:ext>
+                </a:extLst>
+              </a:tr>
+              <a:tr h="370840">
+                <a:tc>
+                  <a:txBody>
+                    <a:bodyPr/>
+                    <a:lstStyle/>
+                    <a:p>
+                      <a:r>
+                        <a:rPr lang="en-GB" dirty="0"/>
+                        <a:t>5-9</a:t>
+                      </a:r>
+                    </a:p>
+                  </a:txBody>
+                  <a:tcPr>
+                    <a:lnL w="12700" cap="flat" cmpd="sng" algn="ctr">
+                      <a:solidFill>
+                        <a:schemeClr val="tx1"/>
+                      </a:solidFill>
+                      <a:prstDash val="solid"/>
+                      <a:round/>
+                      <a:headEnd type="none" w="med" len="med"/>
+                      <a:tailEnd type="none" w="med" len="med"/>
+                    </a:lnL>
+                    <a:lnR w="12700" cap="flat" cmpd="sng" algn="ctr">
+                      <a:solidFill>
+                        <a:schemeClr val="tx1"/>
+                      </a:solidFill>
+                      <a:prstDash val="solid"/>
+                      <a:round/>
+                      <a:headEnd type="none" w="med" len="med"/>
+                      <a:tailEnd type="none" w="med" len="med"/>
+                    </a:lnR>
+                    <a:lnT w="12700" cap="flat" cmpd="sng" algn="ctr">
+                      <a:solidFill>
+                        <a:schemeClr val="tx1"/>
+                      </a:solidFill>
+                      <a:prstDash val="solid"/>
+                      <a:round/>
+                      <a:headEnd type="none" w="med" len="med"/>
+                      <a:tailEnd type="none" w="med" len="med"/>
+                    </a:lnT>
+                    <a:lnB w="12700" cap="flat" cmpd="sng" algn="ctr">
+                      <a:solidFill>
+                        <a:schemeClr val="tx1"/>
+                      </a:solidFill>
+                      <a:prstDash val="solid"/>
+                      <a:round/>
+                      <a:headEnd type="none" w="med" len="med"/>
+                      <a:tailEnd type="none" w="med" len="med"/>
+                    </a:lnB>
+                  </a:tcPr>
+                </a:tc>
+                <a:tc>
+                  <a:txBody>
+                    <a:bodyPr/>
+                    <a:lstStyle/>
+                    <a:p>
+                      <a:r>
+                        <a:rPr lang="en-GB" dirty="0"/>
+                        <a:t>1.2</a:t>
+                      </a:r>
+                    </a:p>
+                  </a:txBody>
+                  <a:tcPr>
+                    <a:lnL w="12700" cap="flat" cmpd="sng" algn="ctr">
+                      <a:solidFill>
+                        <a:schemeClr val="tx1"/>
+                      </a:solidFill>
+                      <a:prstDash val="solid"/>
+                      <a:round/>
+                      <a:headEnd type="none" w="med" len="med"/>
+                      <a:tailEnd type="none" w="med" len="med"/>
+                    </a:lnL>
+                    <a:lnR w="12700" cap="flat" cmpd="sng" algn="ctr">
+                      <a:solidFill>
+                        <a:schemeClr val="tx1"/>
+                      </a:solidFill>
+                      <a:prstDash val="solid"/>
+                      <a:round/>
+                      <a:headEnd type="none" w="med" len="med"/>
+                      <a:tailEnd type="none" w="med" len="med"/>
+                    </a:lnR>
+                    <a:lnT w="12700" cap="flat" cmpd="sng" algn="ctr">
+                      <a:solidFill>
+                        <a:schemeClr val="tx1"/>
+                      </a:solidFill>
+                      <a:prstDash val="solid"/>
+                      <a:round/>
+                      <a:headEnd type="none" w="med" len="med"/>
+                      <a:tailEnd type="none" w="med" len="med"/>
+                    </a:lnT>
+                    <a:lnB w="12700" cap="flat" cmpd="sng" algn="ctr">
+                      <a:solidFill>
+                        <a:schemeClr val="tx1"/>
+                      </a:solidFill>
+                      <a:prstDash val="solid"/>
+                      <a:round/>
+                      <a:headEnd type="none" w="med" len="med"/>
+                      <a:tailEnd type="none" w="med" len="med"/>
+                    </a:lnB>
+                  </a:tcPr>
+                </a:tc>
+                <a:tc>
+                  <a:txBody>
+                    <a:bodyPr/>
+                    <a:lstStyle/>
+                    <a:p>
+                      <a:r>
+                        <a:rPr lang="en-GB" dirty="0"/>
+                        <a:t>5.6</a:t>
+                      </a:r>
+                    </a:p>
+                  </a:txBody>
+                  <a:tcPr>
+                    <a:lnL w="12700" cap="flat" cmpd="sng" algn="ctr">
+                      <a:solidFill>
+                        <a:schemeClr val="tx1"/>
+                      </a:solidFill>
+                      <a:prstDash val="solid"/>
+                      <a:round/>
+                      <a:headEnd type="none" w="med" len="med"/>
+                      <a:tailEnd type="none" w="med" len="med"/>
+                    </a:lnL>
+                    <a:lnR w="12700" cap="flat" cmpd="sng" algn="ctr">
+                      <a:solidFill>
+                        <a:schemeClr val="tx1"/>
+                      </a:solidFill>
+                      <a:prstDash val="solid"/>
+                      <a:round/>
+                      <a:headEnd type="none" w="med" len="med"/>
+                      <a:tailEnd type="none" w="med" len="med"/>
+                    </a:lnR>
+                    <a:lnT w="12700" cap="flat" cmpd="sng" algn="ctr">
+                      <a:solidFill>
+                        <a:schemeClr val="tx1"/>
+                      </a:solidFill>
+                      <a:prstDash val="solid"/>
+                      <a:round/>
+                      <a:headEnd type="none" w="med" len="med"/>
+                      <a:tailEnd type="none" w="med" len="med"/>
+                    </a:lnT>
+                    <a:lnB w="12700" cap="flat" cmpd="sng" algn="ctr">
+                      <a:solidFill>
+                        <a:schemeClr val="tx1"/>
+                      </a:solidFill>
+                      <a:prstDash val="solid"/>
+                      <a:round/>
+                      <a:headEnd type="none" w="med" len="med"/>
+                      <a:tailEnd type="none" w="med" len="med"/>
+                    </a:lnB>
+                  </a:tcPr>
+                </a:tc>
+                <a:tc>
+                  <a:txBody>
+                    <a:bodyPr/>
+                    <a:lstStyle/>
+                    <a:p>
+                      <a:r>
+                        <a:rPr lang="en-GB" dirty="0"/>
+                        <a:t>1.2</a:t>
+                      </a:r>
+                    </a:p>
+                  </a:txBody>
+                  <a:tcPr>
+                    <a:lnL w="12700" cap="flat" cmpd="sng" algn="ctr">
+                      <a:solidFill>
+                        <a:schemeClr val="tx1"/>
+                      </a:solidFill>
+                      <a:prstDash val="solid"/>
+                      <a:round/>
+                      <a:headEnd type="none" w="med" len="med"/>
+                      <a:tailEnd type="none" w="med" len="med"/>
+                    </a:lnL>
+                    <a:lnR w="12700" cap="flat" cmpd="sng" algn="ctr">
+                      <a:solidFill>
+                        <a:schemeClr val="tx1"/>
+                      </a:solidFill>
+                      <a:prstDash val="solid"/>
+                      <a:round/>
+                      <a:headEnd type="none" w="med" len="med"/>
+                      <a:tailEnd type="none" w="med" len="med"/>
+                    </a:lnR>
+                    <a:lnT w="12700" cap="flat" cmpd="sng" algn="ctr">
+                      <a:solidFill>
+                        <a:schemeClr val="tx1"/>
+                      </a:solidFill>
+                      <a:prstDash val="solid"/>
+                      <a:round/>
+                      <a:headEnd type="none" w="med" len="med"/>
+                      <a:tailEnd type="none" w="med" len="med"/>
+                    </a:lnT>
+                    <a:lnB w="12700" cap="flat" cmpd="sng" algn="ctr">
+                      <a:solidFill>
+                        <a:schemeClr val="tx1"/>
+                      </a:solidFill>
+                      <a:prstDash val="solid"/>
+                      <a:round/>
+                      <a:headEnd type="none" w="med" len="med"/>
+                      <a:tailEnd type="none" w="med" len="med"/>
+                    </a:lnB>
+                  </a:tcPr>
+                </a:tc>
+                <a:extLst>
+                  <a:ext uri="{0D108BD9-81ED-4DB2-BD59-A6C34878D82A}">
+                    <a16:rowId xmlns:a16="http://schemas.microsoft.com/office/drawing/2014/main" val="85029971"/>
+                  </a:ext>
+                </a:extLst>
+              </a:tr>
+              <a:tr h="370840">
+                <a:tc>
+                  <a:txBody>
+                    <a:bodyPr/>
+                    <a:lstStyle/>
+                    <a:p>
+                      <a:r>
+                        <a:rPr lang="en-GB" dirty="0"/>
+                        <a:t>10-14</a:t>
+                      </a:r>
+                    </a:p>
+                  </a:txBody>
+                  <a:tcPr>
+                    <a:lnL w="12700" cap="flat" cmpd="sng" algn="ctr">
+                      <a:solidFill>
+                        <a:schemeClr val="tx1"/>
+                      </a:solidFill>
+                      <a:prstDash val="solid"/>
+                      <a:round/>
+                      <a:headEnd type="none" w="med" len="med"/>
+                      <a:tailEnd type="none" w="med" len="med"/>
+                    </a:lnL>
+                    <a:lnR w="12700" cap="flat" cmpd="sng" algn="ctr">
+                      <a:solidFill>
+                        <a:schemeClr val="tx1"/>
+                      </a:solidFill>
+                      <a:prstDash val="solid"/>
+                      <a:round/>
+                      <a:headEnd type="none" w="med" len="med"/>
+                      <a:tailEnd type="none" w="med" len="med"/>
+                    </a:lnR>
+                    <a:lnT w="12700" cap="flat" cmpd="sng" algn="ctr">
+                      <a:solidFill>
+                        <a:schemeClr val="tx1"/>
+                      </a:solidFill>
+                      <a:prstDash val="solid"/>
+                      <a:round/>
+                      <a:headEnd type="none" w="med" len="med"/>
+                      <a:tailEnd type="none" w="med" len="med"/>
+                    </a:lnT>
+                    <a:lnB w="12700" cap="flat" cmpd="sng" algn="ctr">
+                      <a:solidFill>
+                        <a:schemeClr val="tx1"/>
+                      </a:solidFill>
+                      <a:prstDash val="solid"/>
+                      <a:round/>
+                      <a:headEnd type="none" w="med" len="med"/>
+                      <a:tailEnd type="none" w="med" len="med"/>
+                    </a:lnB>
+                  </a:tcPr>
+                </a:tc>
+                <a:tc>
+                  <a:txBody>
+                    <a:bodyPr/>
+                    <a:lstStyle/>
+                    <a:p>
+                      <a:r>
+                        <a:rPr lang="en-GB" dirty="0"/>
+                        <a:t>0.8</a:t>
+                      </a:r>
+                    </a:p>
+                  </a:txBody>
+                  <a:tcPr>
+                    <a:lnL w="12700" cap="flat" cmpd="sng" algn="ctr">
+                      <a:solidFill>
+                        <a:schemeClr val="tx1"/>
+                      </a:solidFill>
+                      <a:prstDash val="solid"/>
+                      <a:round/>
+                      <a:headEnd type="none" w="med" len="med"/>
+                      <a:tailEnd type="none" w="med" len="med"/>
+                    </a:lnL>
+                    <a:lnR w="12700" cap="flat" cmpd="sng" algn="ctr">
+                      <a:solidFill>
+                        <a:schemeClr val="tx1"/>
+                      </a:solidFill>
+                      <a:prstDash val="solid"/>
+                      <a:round/>
+                      <a:headEnd type="none" w="med" len="med"/>
+                      <a:tailEnd type="none" w="med" len="med"/>
+                    </a:lnR>
+                    <a:lnT w="12700" cap="flat" cmpd="sng" algn="ctr">
+                      <a:solidFill>
+                        <a:schemeClr val="tx1"/>
+                      </a:solidFill>
+                      <a:prstDash val="solid"/>
+                      <a:round/>
+                      <a:headEnd type="none" w="med" len="med"/>
+                      <a:tailEnd type="none" w="med" len="med"/>
+                    </a:lnT>
+                    <a:lnB w="12700" cap="flat" cmpd="sng" algn="ctr">
+                      <a:solidFill>
+                        <a:schemeClr val="tx1"/>
+                      </a:solidFill>
+                      <a:prstDash val="solid"/>
+                      <a:round/>
+                      <a:headEnd type="none" w="med" len="med"/>
+                      <a:tailEnd type="none" w="med" len="med"/>
+                    </a:lnB>
+                  </a:tcPr>
+                </a:tc>
+                <a:tc>
+                  <a:txBody>
+                    <a:bodyPr/>
+                    <a:lstStyle/>
+                    <a:p>
+                      <a:r>
+                        <a:rPr lang="en-GB" dirty="0"/>
+                        <a:t>0.9</a:t>
+                      </a:r>
+                    </a:p>
+                  </a:txBody>
+                  <a:tcPr>
+                    <a:lnL w="12700" cap="flat" cmpd="sng" algn="ctr">
+                      <a:solidFill>
+                        <a:schemeClr val="tx1"/>
+                      </a:solidFill>
+                      <a:prstDash val="solid"/>
+                      <a:round/>
+                      <a:headEnd type="none" w="med" len="med"/>
+                      <a:tailEnd type="none" w="med" len="med"/>
+                    </a:lnL>
+                    <a:lnR w="12700" cap="flat" cmpd="sng" algn="ctr">
+                      <a:solidFill>
+                        <a:schemeClr val="tx1"/>
+                      </a:solidFill>
+                      <a:prstDash val="solid"/>
+                      <a:round/>
+                      <a:headEnd type="none" w="med" len="med"/>
+                      <a:tailEnd type="none" w="med" len="med"/>
+                    </a:lnR>
+                    <a:lnT w="12700" cap="flat" cmpd="sng" algn="ctr">
+                      <a:solidFill>
+                        <a:schemeClr val="tx1"/>
+                      </a:solidFill>
+                      <a:prstDash val="solid"/>
+                      <a:round/>
+                      <a:headEnd type="none" w="med" len="med"/>
+                      <a:tailEnd type="none" w="med" len="med"/>
+                    </a:lnT>
+                    <a:lnB w="12700" cap="flat" cmpd="sng" algn="ctr">
+                      <a:solidFill>
+                        <a:schemeClr val="tx1"/>
+                      </a:solidFill>
+                      <a:prstDash val="solid"/>
+                      <a:round/>
+                      <a:headEnd type="none" w="med" len="med"/>
+                      <a:tailEnd type="none" w="med" len="med"/>
+                    </a:lnB>
+                  </a:tcPr>
+                </a:tc>
+                <a:tc>
+                  <a:txBody>
+                    <a:bodyPr/>
+                    <a:lstStyle/>
+                    <a:p>
+                      <a:r>
+                        <a:rPr lang="en-GB" dirty="0"/>
+                        <a:t>7.8</a:t>
+                      </a:r>
+                    </a:p>
+                  </a:txBody>
+                  <a:tcPr>
+                    <a:lnL w="12700" cap="flat" cmpd="sng" algn="ctr">
+                      <a:solidFill>
+                        <a:schemeClr val="tx1"/>
+                      </a:solidFill>
+                      <a:prstDash val="solid"/>
+                      <a:round/>
+                      <a:headEnd type="none" w="med" len="med"/>
+                      <a:tailEnd type="none" w="med" len="med"/>
+                    </a:lnL>
+                    <a:lnR w="12700" cap="flat" cmpd="sng" algn="ctr">
+                      <a:solidFill>
+                        <a:schemeClr val="tx1"/>
+                      </a:solidFill>
+                      <a:prstDash val="solid"/>
+                      <a:round/>
+                      <a:headEnd type="none" w="med" len="med"/>
+                      <a:tailEnd type="none" w="med" len="med"/>
+                    </a:lnR>
+                    <a:lnT w="12700" cap="flat" cmpd="sng" algn="ctr">
+                      <a:solidFill>
+                        <a:schemeClr val="tx1"/>
+                      </a:solidFill>
+                      <a:prstDash val="solid"/>
+                      <a:round/>
+                      <a:headEnd type="none" w="med" len="med"/>
+                      <a:tailEnd type="none" w="med" len="med"/>
+                    </a:lnT>
+                    <a:lnB w="12700" cap="flat" cmpd="sng" algn="ctr">
+                      <a:solidFill>
+                        <a:schemeClr val="tx1"/>
+                      </a:solidFill>
+                      <a:prstDash val="solid"/>
+                      <a:round/>
+                      <a:headEnd type="none" w="med" len="med"/>
+                      <a:tailEnd type="none" w="med" len="med"/>
+                    </a:lnB>
+                  </a:tcPr>
+                </a:tc>
+                <a:extLst>
+                  <a:ext uri="{0D108BD9-81ED-4DB2-BD59-A6C34878D82A}">
+                    <a16:rowId xmlns:a16="http://schemas.microsoft.com/office/drawing/2014/main" val="4189700572"/>
+                  </a:ext>
+                </a:extLst>
+              </a:tr>
+            </a:tbl>
+          </a:graphicData>
+        </a:graphic>
+      </p:graphicFrame>
+      <p:sp>
+        <p:nvSpPr>
+          <p:cNvPr id="4" name="Rectangle 3">
+            <a:extLst>
+              <a:ext uri="{FF2B5EF4-FFF2-40B4-BE49-F238E27FC236}">
+                <a16:creationId xmlns:a16="http://schemas.microsoft.com/office/drawing/2014/main" id="{16105F0A-66D7-9A76-596A-28B0F338E142}"/>
+              </a:ext>
+            </a:extLst>
+          </p:cNvPr>
+          <p:cNvSpPr/>
+          <p:nvPr/>
+        </p:nvSpPr>
+        <p:spPr>
+          <a:xfrm>
+            <a:off x="4124739" y="2415209"/>
+            <a:ext cx="1093304" cy="308113"/>
+          </a:xfrm>
+          <a:prstGeom prst="rect">
+            <a:avLst/>
+          </a:prstGeom>
+          <a:noFill/>
+          <a:ln w="28575">
+            <a:solidFill>
+              <a:srgbClr val="FF0000"/>
+            </a:solidFill>
+          </a:ln>
+        </p:spPr>
+        <p:style>
+          <a:lnRef idx="1">
+            <a:schemeClr val="accent1"/>
+          </a:lnRef>
+          <a:fillRef idx="3">
+            <a:schemeClr val="accent1"/>
+          </a:fillRef>
+          <a:effectRef idx="2">
+            <a:schemeClr val="accent1"/>
+          </a:effectRef>
+          <a:fontRef idx="minor">
+            <a:schemeClr val="lt1"/>
+          </a:fontRef>
+        </p:style>
+        <p:txBody>
+          <a:bodyPr rtlCol="0" anchor="ctr"/>
+          <a:lstStyle/>
+          <a:p>
+            <a:pPr algn="ctr"/>
+            <a:endParaRPr lang="en-GB"/>
+          </a:p>
+        </p:txBody>
+      </p:sp>
+      <p:sp>
+        <p:nvSpPr>
+          <p:cNvPr id="6" name="Rectangle 5">
+            <a:extLst>
+              <a:ext uri="{FF2B5EF4-FFF2-40B4-BE49-F238E27FC236}">
+                <a16:creationId xmlns:a16="http://schemas.microsoft.com/office/drawing/2014/main" id="{021A620C-FDD5-3DA4-C55C-C127E726D085}"/>
+              </a:ext>
+            </a:extLst>
+          </p:cNvPr>
+          <p:cNvSpPr/>
+          <p:nvPr/>
+        </p:nvSpPr>
+        <p:spPr>
+          <a:xfrm>
+            <a:off x="2980491" y="2782699"/>
+            <a:ext cx="1093304" cy="308113"/>
+          </a:xfrm>
+          <a:prstGeom prst="rect">
+            <a:avLst/>
+          </a:prstGeom>
+          <a:noFill/>
+          <a:ln w="28575">
+            <a:solidFill>
+              <a:srgbClr val="FF0000"/>
+            </a:solidFill>
+          </a:ln>
+        </p:spPr>
+        <p:style>
+          <a:lnRef idx="1">
+            <a:schemeClr val="accent1"/>
+          </a:lnRef>
+          <a:fillRef idx="3">
+            <a:schemeClr val="accent1"/>
+          </a:fillRef>
+          <a:effectRef idx="2">
+            <a:schemeClr val="accent1"/>
+          </a:effectRef>
+          <a:fontRef idx="minor">
+            <a:schemeClr val="lt1"/>
+          </a:fontRef>
+        </p:style>
+        <p:txBody>
+          <a:bodyPr rtlCol="0" anchor="ctr"/>
+          <a:lstStyle/>
+          <a:p>
+            <a:pPr algn="ctr"/>
+            <a:endParaRPr lang="en-GB"/>
+          </a:p>
+        </p:txBody>
+      </p:sp>
+    </p:spTree>
+    <p:extLst>
+      <p:ext uri="{BB962C8B-B14F-4D97-AF65-F5344CB8AC3E}">
+        <p14:creationId xmlns:p14="http://schemas.microsoft.com/office/powerpoint/2010/main" val="164535097"/>
+      </p:ext>
+    </p:extLst>
   </p:cSld>
   <p:clrMapOvr>
     <a:masterClrMapping/>
@@ -7463,6 +10201,7 @@
               <a:buNone/>
             </a:pPr>
             <a:r>
+              <a:rPr dirty="0"/>
               <a:t>Metapopulations</a:t>
             </a:r>
           </a:p>
@@ -7542,18 +10281,53 @@
           <a:p>
             <a:pPr lvl="1"/>
             <a:r>
+              <a:rPr dirty="0"/>
               <a:t>So far we’ve assumed everyone mixes together randomly</a:t>
             </a:r>
           </a:p>
           <a:p>
             <a:pPr lvl="1"/>
             <a:r>
-              <a:t>In reality, people may group together in different locations/settings/groups</a:t>
+              <a:rPr dirty="0"/>
+              <a:t>In reality, people may group together in different locations</a:t>
+            </a:r>
+            <a:r>
+              <a:rPr lang="en-GB" dirty="0"/>
+              <a:t> </a:t>
+            </a:r>
+            <a:r>
+              <a:rPr dirty="0"/>
+              <a:t>/</a:t>
+            </a:r>
+            <a:r>
+              <a:rPr lang="en-GB" dirty="0"/>
+              <a:t> </a:t>
+            </a:r>
+            <a:r>
+              <a:rPr dirty="0"/>
+              <a:t>settings</a:t>
+            </a:r>
+            <a:r>
+              <a:rPr lang="en-GB" dirty="0"/>
+              <a:t> </a:t>
+            </a:r>
+            <a:r>
+              <a:rPr dirty="0"/>
+              <a:t>/</a:t>
+            </a:r>
+            <a:r>
+              <a:rPr lang="en-GB" dirty="0"/>
+              <a:t> </a:t>
+            </a:r>
+            <a:r>
+              <a:rPr dirty="0"/>
+              <a:t>groups</a:t>
             </a:r>
           </a:p>
           <a:p>
             <a:pPr lvl="1"/>
             <a:r>
+              <a:rPr dirty="0"/>
               <a:t>If we’re interested in heterogeneity, we need to model multiple populations (‘metapopulations’)</a:t>
             </a:r>
           </a:p>

</xml_diff>